<commit_message>
made philosphers take up less time
</commit_message>
<xml_diff>
--- a/animalsClass/Deep History Of the field of Perception.pptx
+++ b/animalsClass/Deep History Of the field of Perception.pptx
@@ -5,7 +5,7 @@
     <p:sldMasterId id="2147483762" r:id="rId1"/>
   </p:sldMasterIdLst>
   <p:notesMasterIdLst>
-    <p:notesMasterId r:id="rId21"/>
+    <p:notesMasterId r:id="rId19"/>
   </p:notesMasterIdLst>
   <p:sldIdLst>
     <p:sldId id="256" r:id="rId2"/>
@@ -17,16 +17,14 @@
     <p:sldId id="261" r:id="rId8"/>
     <p:sldId id="260" r:id="rId9"/>
     <p:sldId id="276" r:id="rId10"/>
-    <p:sldId id="270" r:id="rId11"/>
-    <p:sldId id="277" r:id="rId12"/>
-    <p:sldId id="272" r:id="rId13"/>
-    <p:sldId id="264" r:id="rId14"/>
-    <p:sldId id="273" r:id="rId15"/>
-    <p:sldId id="265" r:id="rId16"/>
-    <p:sldId id="274" r:id="rId17"/>
-    <p:sldId id="266" r:id="rId18"/>
-    <p:sldId id="275" r:id="rId19"/>
-    <p:sldId id="267" r:id="rId20"/>
+    <p:sldId id="277" r:id="rId11"/>
+    <p:sldId id="264" r:id="rId12"/>
+    <p:sldId id="273" r:id="rId13"/>
+    <p:sldId id="265" r:id="rId14"/>
+    <p:sldId id="274" r:id="rId15"/>
+    <p:sldId id="266" r:id="rId16"/>
+    <p:sldId id="275" r:id="rId17"/>
+    <p:sldId id="267" r:id="rId18"/>
   </p:sldIdLst>
   <p:sldSz cx="12192000" cy="6858000"/>
   <p:notesSz cx="6858000" cy="9144000"/>
@@ -533,11 +531,7 @@
             </a:r>
             <a:r>
               <a:rPr lang="en-US" baseline="0" dirty="0" smtClean="0"/>
-              <a:t> who you are and what you </a:t>
-            </a:r>
-            <a:r>
-              <a:rPr lang="en-US" baseline="0" dirty="0" smtClean="0"/>
-              <a:t>do</a:t>
+              <a:t> who you are and what you do</a:t>
             </a:r>
           </a:p>
           <a:p>
@@ -561,15 +555,7 @@
             </a:pPr>
             <a:r>
               <a:rPr lang="en-US" baseline="0" dirty="0" smtClean="0"/>
-              <a:t>This </a:t>
-            </a:r>
-            <a:r>
-              <a:rPr lang="en-US" baseline="0" dirty="0" smtClean="0"/>
-              <a:t>means I study a lot of, how do people understand and process what they </a:t>
-            </a:r>
-            <a:r>
-              <a:rPr lang="en-US" baseline="0" dirty="0" smtClean="0"/>
-              <a:t>touch, and ONLY what they touch, not what they SEE and TOUCH. That isn’t me </a:t>
+              <a:t>This means I study a lot of, how do people understand and process what they touch, and ONLY what they touch, not what they SEE and TOUCH. That isn’t me </a:t>
             </a:r>
           </a:p>
           <a:p>
@@ -586,31 +572,7 @@
             </a:pPr>
             <a:r>
               <a:rPr lang="en-US" baseline="0" dirty="0" smtClean="0"/>
-              <a:t>I </a:t>
-            </a:r>
-            <a:r>
-              <a:rPr lang="en-US" baseline="0" dirty="0" smtClean="0"/>
-              <a:t>plan to study haptic perception </a:t>
-            </a:r>
-            <a:r>
-              <a:rPr lang="en-US" baseline="0" dirty="0" smtClean="0"/>
-              <a:t>mainly in the hands, but I want to be able to study it across </a:t>
-            </a:r>
-            <a:r>
-              <a:rPr lang="en-US" baseline="0" dirty="0" smtClean="0"/>
-              <a:t>the body </a:t>
-            </a:r>
-            <a:r>
-              <a:rPr lang="en-US" baseline="0" dirty="0" smtClean="0"/>
-              <a:t>and across space and MAYBE lower </a:t>
-            </a:r>
-            <a:r>
-              <a:rPr lang="en-US" baseline="0" dirty="0" smtClean="0"/>
-              <a:t>appendages (maybe</a:t>
-            </a:r>
-            <a:r>
-              <a:rPr lang="en-US" baseline="0" dirty="0" smtClean="0"/>
-              <a:t>). -&gt; ill get back to this </a:t>
+              <a:t>I plan to study haptic perception mainly in the hands, but I want to be able to study it across the body and across space and MAYBE lower appendages (maybe). -&gt; ill get back to this </a:t>
             </a:r>
           </a:p>
           <a:p>
@@ -627,11 +589,7 @@
             </a:pPr>
             <a:r>
               <a:rPr lang="en-US" baseline="0" dirty="0" smtClean="0"/>
-              <a:t>The purpose of this work, for those who are curious is to develop better VR and AR experiences and make these systems for the future more refined and better suited for human use and exploration</a:t>
-            </a:r>
-            <a:r>
-              <a:rPr lang="en-US" baseline="0" dirty="0" smtClean="0"/>
-              <a:t>.</a:t>
+              <a:t>The purpose of this work, for those who are curious is to develop better VR and AR experiences and make these systems for the future more refined and better suited for human use and exploration.</a:t>
             </a:r>
             <a:br>
               <a:rPr lang="en-US" baseline="0" dirty="0" smtClean="0"/>
@@ -686,6 +644,90 @@
     <p:extLst>
       <p:ext uri="{BB962C8B-B14F-4D97-AF65-F5344CB8AC3E}">
         <p14:creationId xmlns:p14="http://schemas.microsoft.com/office/powerpoint/2010/main" val="2620022585"/>
+      </p:ext>
+    </p:extLst>
+  </p:cSld>
+  <p:clrMapOvr>
+    <a:masterClrMapping/>
+  </p:clrMapOvr>
+</p:notes>
+</file>
+
+<file path=ppt/notesSlides/notesSlide10.xml><?xml version="1.0" encoding="utf-8"?>
+<p:notes xmlns:a="http://schemas.openxmlformats.org/drawingml/2006/main" xmlns:r="http://schemas.openxmlformats.org/officeDocument/2006/relationships" xmlns:p="http://schemas.openxmlformats.org/presentationml/2006/main">
+  <p:cSld>
+    <p:spTree>
+      <p:nvGrpSpPr>
+        <p:cNvPr id="1" name=""/>
+        <p:cNvGrpSpPr/>
+        <p:nvPr/>
+      </p:nvGrpSpPr>
+      <p:grpSpPr>
+        <a:xfrm>
+          <a:off x="0" y="0"/>
+          <a:ext cx="0" cy="0"/>
+          <a:chOff x="0" y="0"/>
+          <a:chExt cx="0" cy="0"/>
+        </a:xfrm>
+      </p:grpSpPr>
+      <p:sp>
+        <p:nvSpPr>
+          <p:cNvPr id="2" name="Slide Image Placeholder 1"/>
+          <p:cNvSpPr>
+            <a:spLocks noGrp="1" noRot="1" noChangeAspect="1"/>
+          </p:cNvSpPr>
+          <p:nvPr>
+            <p:ph type="sldImg"/>
+          </p:nvPr>
+        </p:nvSpPr>
+        <p:spPr/>
+      </p:sp>
+      <p:sp>
+        <p:nvSpPr>
+          <p:cNvPr id="3" name="Notes Placeholder 2"/>
+          <p:cNvSpPr>
+            <a:spLocks noGrp="1"/>
+          </p:cNvSpPr>
+          <p:nvPr>
+            <p:ph type="body" idx="1"/>
+          </p:nvPr>
+        </p:nvSpPr>
+        <p:spPr/>
+        <p:txBody>
+          <a:bodyPr/>
+          <a:lstStyle/>
+          <a:p>
+            <a:endParaRPr lang="en-US" dirty="0"/>
+          </a:p>
+        </p:txBody>
+      </p:sp>
+      <p:sp>
+        <p:nvSpPr>
+          <p:cNvPr id="4" name="Slide Number Placeholder 3"/>
+          <p:cNvSpPr>
+            <a:spLocks noGrp="1"/>
+          </p:cNvSpPr>
+          <p:nvPr>
+            <p:ph type="sldNum" sz="quarter" idx="10"/>
+          </p:nvPr>
+        </p:nvSpPr>
+        <p:spPr/>
+        <p:txBody>
+          <a:bodyPr/>
+          <a:lstStyle/>
+          <a:p>
+            <a:fld id="{DCA2563F-DB87-4291-BC4C-84A32321EAED}" type="slidenum">
+              <a:rPr lang="en-US" smtClean="0"/>
+              <a:t>17</a:t>
+            </a:fld>
+            <a:endParaRPr lang="en-US"/>
+          </a:p>
+        </p:txBody>
+      </p:sp>
+    </p:spTree>
+    <p:extLst>
+      <p:ext uri="{BB962C8B-B14F-4D97-AF65-F5344CB8AC3E}">
+        <p14:creationId xmlns:p14="http://schemas.microsoft.com/office/powerpoint/2010/main" val="1086968277"/>
       </p:ext>
     </p:extLst>
   </p:cSld>
@@ -961,7 +1003,6 @@
               <a:rPr lang="en-US" baseline="0" dirty="0" smtClean="0"/>
               <a:t>, he came almost 1000 years later but was the first studier of optics, geometrically and also of human vision and biology, showing here the optic chasm </a:t>
             </a:r>
-            <a:endParaRPr lang="en-US" baseline="0" dirty="0" smtClean="0"/>
           </a:p>
           <a:p>
             <a:pPr marL="171450" indent="-171450">
@@ -1367,6 +1408,18 @@
               <a:rPr lang="en-US" dirty="0" err="1" smtClean="0"/>
               <a:t>Wudnt</a:t>
             </a:r>
+            <a:r>
+              <a:rPr lang="en-US" dirty="0" smtClean="0"/>
+              <a:t> and find</a:t>
+            </a:r>
+            <a:r>
+              <a:rPr lang="en-US" baseline="0" dirty="0" smtClean="0"/>
+              <a:t> his </a:t>
+            </a:r>
+            <a:r>
+              <a:rPr lang="en-US" baseline="0" dirty="0" err="1" smtClean="0"/>
+              <a:t>disiplies</a:t>
+            </a:r>
             <a:endParaRPr lang="en-US" dirty="0"/>
           </a:p>
         </p:txBody>
@@ -1388,7 +1441,7 @@
           <a:p>
             <a:fld id="{DCA2563F-DB87-4291-BC4C-84A32321EAED}" type="slidenum">
               <a:rPr lang="en-US" smtClean="0"/>
-              <a:t>13</a:t>
+              <a:t>11</a:t>
             </a:fld>
             <a:endParaRPr lang="en-US"/>
           </a:p>
@@ -1453,47 +1506,11 @@
           <a:p>
             <a:r>
               <a:rPr lang="en-US" dirty="0" smtClean="0"/>
-              <a:t>- The older </a:t>
-            </a:r>
-            <a:r>
-              <a:rPr lang="en-US" dirty="0" err="1" smtClean="0"/>
-              <a:t>guyt</a:t>
-            </a:r>
-            <a:r>
-              <a:rPr lang="en-US" dirty="0" smtClean="0"/>
-              <a:t>, </a:t>
-            </a:r>
-            <a:r>
-              <a:rPr lang="en-US" dirty="0" err="1" smtClean="0"/>
-              <a:t>david</a:t>
+              <a:t>Just talk about the explosion in</a:t>
             </a:r>
             <a:r>
               <a:rPr lang="en-US" baseline="0" dirty="0" smtClean="0"/>
-              <a:t> </a:t>
-            </a:r>
-            <a:r>
-              <a:rPr lang="en-US" baseline="0" dirty="0" err="1" smtClean="0"/>
-              <a:t>hubel</a:t>
-            </a:r>
-            <a:r>
-              <a:rPr lang="en-US" baseline="0" dirty="0" smtClean="0"/>
-              <a:t>, </a:t>
-            </a:r>
-            <a:r>
-              <a:rPr lang="en-US" baseline="0" dirty="0" err="1" smtClean="0"/>
-              <a:t>acc</a:t>
-            </a:r>
-            <a:r>
-              <a:rPr lang="en-US" baseline="0" dirty="0" smtClean="0"/>
-              <a:t> made the tungsten </a:t>
-            </a:r>
-            <a:r>
-              <a:rPr lang="en-US" baseline="0" dirty="0" err="1" smtClean="0"/>
-              <a:t>electonde</a:t>
-            </a:r>
-            <a:r>
-              <a:rPr lang="en-US" baseline="0" dirty="0" smtClean="0"/>
-              <a:t> </a:t>
+              <a:t> psychological theories</a:t>
             </a:r>
             <a:endParaRPr lang="en-US" dirty="0"/>
           </a:p>
@@ -1516,7 +1533,168 @@
           <a:p>
             <a:fld id="{DCA2563F-DB87-4291-BC4C-84A32321EAED}" type="slidenum">
               <a:rPr lang="en-US" smtClean="0"/>
-              <a:t>15</a:t>
+              <a:t>12</a:t>
+            </a:fld>
+            <a:endParaRPr lang="en-US"/>
+          </a:p>
+        </p:txBody>
+      </p:sp>
+    </p:spTree>
+    <p:extLst>
+      <p:ext uri="{BB962C8B-B14F-4D97-AF65-F5344CB8AC3E}">
+        <p14:creationId xmlns:p14="http://schemas.microsoft.com/office/powerpoint/2010/main" val="227746523"/>
+      </p:ext>
+    </p:extLst>
+  </p:cSld>
+  <p:clrMapOvr>
+    <a:masterClrMapping/>
+  </p:clrMapOvr>
+</p:notes>
+</file>
+
+<file path=ppt/notesSlides/notesSlide8.xml><?xml version="1.0" encoding="utf-8"?>
+<p:notes xmlns:a="http://schemas.openxmlformats.org/drawingml/2006/main" xmlns:r="http://schemas.openxmlformats.org/officeDocument/2006/relationships" xmlns:p="http://schemas.openxmlformats.org/presentationml/2006/main">
+  <p:cSld>
+    <p:spTree>
+      <p:nvGrpSpPr>
+        <p:cNvPr id="1" name=""/>
+        <p:cNvGrpSpPr/>
+        <p:nvPr/>
+      </p:nvGrpSpPr>
+      <p:grpSpPr>
+        <a:xfrm>
+          <a:off x="0" y="0"/>
+          <a:ext cx="0" cy="0"/>
+          <a:chOff x="0" y="0"/>
+          <a:chExt cx="0" cy="0"/>
+        </a:xfrm>
+      </p:grpSpPr>
+      <p:sp>
+        <p:nvSpPr>
+          <p:cNvPr id="2" name="Slide Image Placeholder 1"/>
+          <p:cNvSpPr>
+            <a:spLocks noGrp="1" noRot="1" noChangeAspect="1"/>
+          </p:cNvSpPr>
+          <p:nvPr>
+            <p:ph type="sldImg"/>
+          </p:nvPr>
+        </p:nvSpPr>
+        <p:spPr/>
+      </p:sp>
+      <p:sp>
+        <p:nvSpPr>
+          <p:cNvPr id="3" name="Notes Placeholder 2"/>
+          <p:cNvSpPr>
+            <a:spLocks noGrp="1"/>
+          </p:cNvSpPr>
+          <p:nvPr>
+            <p:ph type="body" idx="1"/>
+          </p:nvPr>
+        </p:nvSpPr>
+        <p:spPr/>
+        <p:txBody>
+          <a:bodyPr/>
+          <a:lstStyle/>
+          <a:p>
+            <a:pPr marL="171450" indent="-171450">
+              <a:buFontTx/>
+              <a:buChar char="-"/>
+            </a:pPr>
+            <a:r>
+              <a:rPr lang="en-US" dirty="0" smtClean="0"/>
+              <a:t>The </a:t>
+            </a:r>
+            <a:r>
+              <a:rPr lang="en-US" dirty="0" smtClean="0"/>
+              <a:t>older </a:t>
+            </a:r>
+            <a:r>
+              <a:rPr lang="en-US" dirty="0" err="1" smtClean="0"/>
+              <a:t>guyt</a:t>
+            </a:r>
+            <a:r>
+              <a:rPr lang="en-US" dirty="0" smtClean="0"/>
+              <a:t>, </a:t>
+            </a:r>
+            <a:r>
+              <a:rPr lang="en-US" dirty="0" err="1" smtClean="0"/>
+              <a:t>david</a:t>
+            </a:r>
+            <a:r>
+              <a:rPr lang="en-US" baseline="0" dirty="0" smtClean="0"/>
+              <a:t> </a:t>
+            </a:r>
+            <a:r>
+              <a:rPr lang="en-US" baseline="0" dirty="0" err="1" smtClean="0"/>
+              <a:t>hubel</a:t>
+            </a:r>
+            <a:r>
+              <a:rPr lang="en-US" baseline="0" dirty="0" smtClean="0"/>
+              <a:t>, </a:t>
+            </a:r>
+            <a:r>
+              <a:rPr lang="en-US" baseline="0" dirty="0" err="1" smtClean="0"/>
+              <a:t>acc</a:t>
+            </a:r>
+            <a:r>
+              <a:rPr lang="en-US" baseline="0" dirty="0" smtClean="0"/>
+              <a:t> made the tungsten </a:t>
+            </a:r>
+            <a:r>
+              <a:rPr lang="en-US" baseline="0" dirty="0" err="1" smtClean="0"/>
+              <a:t>electonde</a:t>
+            </a:r>
+            <a:r>
+              <a:rPr lang="en-US" baseline="0" dirty="0" smtClean="0"/>
+              <a:t> </a:t>
+            </a:r>
+            <a:endParaRPr lang="en-US" baseline="0" dirty="0" smtClean="0"/>
+          </a:p>
+          <a:p>
+            <a:pPr marL="171450" indent="-171450">
+              <a:buFontTx/>
+              <a:buChar char="-"/>
+            </a:pPr>
+            <a:endParaRPr lang="en-US" baseline="0" dirty="0" smtClean="0"/>
+          </a:p>
+          <a:p>
+            <a:pPr marL="171450" indent="-171450">
+              <a:buFontTx/>
+              <a:buChar char="-"/>
+            </a:pPr>
+            <a:endParaRPr lang="en-US" baseline="0" dirty="0" smtClean="0"/>
+          </a:p>
+          <a:p>
+            <a:pPr marL="171450" indent="-171450">
+              <a:buFontTx/>
+              <a:buChar char="-"/>
+            </a:pPr>
+            <a:r>
+              <a:rPr lang="en-US" baseline="0" dirty="0" smtClean="0"/>
+              <a:t>Then talk about in the 1900s - 1950s we get more biological </a:t>
+            </a:r>
+            <a:endParaRPr lang="en-US" dirty="0"/>
+          </a:p>
+        </p:txBody>
+      </p:sp>
+      <p:sp>
+        <p:nvSpPr>
+          <p:cNvPr id="4" name="Slide Number Placeholder 3"/>
+          <p:cNvSpPr>
+            <a:spLocks noGrp="1"/>
+          </p:cNvSpPr>
+          <p:nvPr>
+            <p:ph type="sldNum" sz="quarter" idx="10"/>
+          </p:nvPr>
+        </p:nvSpPr>
+        <p:spPr/>
+        <p:txBody>
+          <a:bodyPr/>
+          <a:lstStyle/>
+          <a:p>
+            <a:fld id="{DCA2563F-DB87-4291-BC4C-84A32321EAED}" type="slidenum">
+              <a:rPr lang="en-US" smtClean="0"/>
+              <a:t>13</a:t>
             </a:fld>
             <a:endParaRPr lang="en-US"/>
           </a:p>
@@ -1526,6 +1704,98 @@
     <p:extLst>
       <p:ext uri="{BB962C8B-B14F-4D97-AF65-F5344CB8AC3E}">
         <p14:creationId xmlns:p14="http://schemas.microsoft.com/office/powerpoint/2010/main" val="2102318599"/>
+      </p:ext>
+    </p:extLst>
+  </p:cSld>
+  <p:clrMapOvr>
+    <a:masterClrMapping/>
+  </p:clrMapOvr>
+</p:notes>
+</file>
+
+<file path=ppt/notesSlides/notesSlide9.xml><?xml version="1.0" encoding="utf-8"?>
+<p:notes xmlns:a="http://schemas.openxmlformats.org/drawingml/2006/main" xmlns:r="http://schemas.openxmlformats.org/officeDocument/2006/relationships" xmlns:p="http://schemas.openxmlformats.org/presentationml/2006/main">
+  <p:cSld>
+    <p:spTree>
+      <p:nvGrpSpPr>
+        <p:cNvPr id="1" name=""/>
+        <p:cNvGrpSpPr/>
+        <p:nvPr/>
+      </p:nvGrpSpPr>
+      <p:grpSpPr>
+        <a:xfrm>
+          <a:off x="0" y="0"/>
+          <a:ext cx="0" cy="0"/>
+          <a:chOff x="0" y="0"/>
+          <a:chExt cx="0" cy="0"/>
+        </a:xfrm>
+      </p:grpSpPr>
+      <p:sp>
+        <p:nvSpPr>
+          <p:cNvPr id="2" name="Slide Image Placeholder 1"/>
+          <p:cNvSpPr>
+            <a:spLocks noGrp="1" noRot="1" noChangeAspect="1"/>
+          </p:cNvSpPr>
+          <p:nvPr>
+            <p:ph type="sldImg"/>
+          </p:nvPr>
+        </p:nvSpPr>
+        <p:spPr/>
+      </p:sp>
+      <p:sp>
+        <p:nvSpPr>
+          <p:cNvPr id="3" name="Notes Placeholder 2"/>
+          <p:cNvSpPr>
+            <a:spLocks noGrp="1"/>
+          </p:cNvSpPr>
+          <p:nvPr>
+            <p:ph type="body" idx="1"/>
+          </p:nvPr>
+        </p:nvSpPr>
+        <p:spPr/>
+        <p:txBody>
+          <a:bodyPr/>
+          <a:lstStyle/>
+          <a:p>
+            <a:r>
+              <a:rPr lang="en-US" dirty="0" smtClean="0"/>
+              <a:t>2 big</a:t>
+            </a:r>
+            <a:r>
+              <a:rPr lang="en-US" baseline="0" dirty="0" smtClean="0"/>
+              <a:t> variants of this come out</a:t>
+            </a:r>
+            <a:endParaRPr lang="en-US" dirty="0"/>
+          </a:p>
+        </p:txBody>
+      </p:sp>
+      <p:sp>
+        <p:nvSpPr>
+          <p:cNvPr id="4" name="Slide Number Placeholder 3"/>
+          <p:cNvSpPr>
+            <a:spLocks noGrp="1"/>
+          </p:cNvSpPr>
+          <p:nvPr>
+            <p:ph type="sldNum" sz="quarter" idx="10"/>
+          </p:nvPr>
+        </p:nvSpPr>
+        <p:spPr/>
+        <p:txBody>
+          <a:bodyPr/>
+          <a:lstStyle/>
+          <a:p>
+            <a:fld id="{DCA2563F-DB87-4291-BC4C-84A32321EAED}" type="slidenum">
+              <a:rPr lang="en-US" smtClean="0"/>
+              <a:t>15</a:t>
+            </a:fld>
+            <a:endParaRPr lang="en-US"/>
+          </a:p>
+        </p:txBody>
+      </p:sp>
+    </p:spTree>
+    <p:extLst>
+      <p:ext uri="{BB962C8B-B14F-4D97-AF65-F5344CB8AC3E}">
+        <p14:creationId xmlns:p14="http://schemas.microsoft.com/office/powerpoint/2010/main" val="561632453"/>
       </p:ext>
     </p:extLst>
   </p:cSld>
@@ -4929,8 +5199,8 @@
     <p:bg>
       <p:bgPr>
         <a:solidFill>
-          <a:schemeClr val="tx2">
-            <a:lumMod val="75000"/>
+          <a:schemeClr val="bg2">
+            <a:lumMod val="25000"/>
           </a:schemeClr>
         </a:solidFill>
         <a:effectLst/>
@@ -4960,7 +5230,12 @@
             <p:ph type="title"/>
           </p:nvPr>
         </p:nvSpPr>
-        <p:spPr/>
+        <p:spPr>
+          <a:xfrm>
+            <a:off x="900302" y="585216"/>
+            <a:ext cx="12351241" cy="1499616"/>
+          </a:xfrm>
+        </p:spPr>
         <p:txBody>
           <a:bodyPr/>
           <a:lstStyle/>
@@ -4971,9 +5246,17 @@
                   <a:schemeClr val="bg2"/>
                 </a:solidFill>
               </a:rPr>
-              <a:t>Pre Scientific revolution – 1800 </a:t>
-            </a:r>
-            <a:endParaRPr lang="en-US" dirty="0">
+              <a:t>1800s Onwards – </a:t>
+            </a:r>
+            <a:r>
+              <a:rPr lang="en-US" sz="4400" dirty="0" smtClean="0">
+                <a:solidFill>
+                  <a:schemeClr val="bg2"/>
+                </a:solidFill>
+              </a:rPr>
+              <a:t>PSYHOPHYSICS! WHAT IS PERCEPTION? </a:t>
+            </a:r>
+            <a:endParaRPr lang="en-US" sz="4400" dirty="0">
               <a:solidFill>
                 <a:schemeClr val="bg2"/>
               </a:solidFill>
@@ -4983,7 +5266,7 @@
       </p:sp>
       <p:pic>
         <p:nvPicPr>
-          <p:cNvPr id="6146" name="Picture 2" descr="William Molyneux - Wikipedia"/>
+          <p:cNvPr id="7170" name="Picture 2" descr="Ernst Heinrich Weber - Wikipedia"/>
           <p:cNvPicPr>
             <a:picLocks noChangeAspect="1" noChangeArrowheads="1"/>
           </p:cNvPicPr>
@@ -5004,8 +5287,8 @@
         </p:blipFill>
         <p:spPr bwMode="auto">
           <a:xfrm>
-            <a:off x="-98425" y="2396948"/>
-            <a:ext cx="3841750" cy="4567415"/>
+            <a:off x="905760" y="2147776"/>
+            <a:ext cx="3132840" cy="4100068"/>
           </a:xfrm>
           <a:prstGeom prst="rect">
             <a:avLst/>
@@ -5024,14 +5307,14 @@
       </p:pic>
       <p:pic>
         <p:nvPicPr>
-          <p:cNvPr id="6150" name="Picture 6" descr="Cubes - Intermediate Geometry"/>
+          <p:cNvPr id="7176" name="Picture 8" descr="File:CrumeyFig3.pdf"/>
           <p:cNvPicPr>
             <a:picLocks noChangeAspect="1" noChangeArrowheads="1"/>
           </p:cNvPicPr>
           <p:nvPr/>
         </p:nvPicPr>
         <p:blipFill>
-          <a:blip r:embed="rId3" cstate="print">
+          <a:blip r:embed="rId3">
             <a:extLst>
               <a:ext uri="{28A0092B-C50C-407E-A947-70E740481C1C}">
                 <a14:useLocalDpi xmlns:a14="http://schemas.microsoft.com/office/drawing/2010/main" val="0"/>
@@ -5045,8 +5328,81 @@
         </p:blipFill>
         <p:spPr bwMode="auto">
           <a:xfrm>
-            <a:off x="3743324" y="2396948"/>
-            <a:ext cx="2473325" cy="2389630"/>
+            <a:off x="0" y="4099426"/>
+            <a:ext cx="3416154" cy="2696018"/>
+          </a:xfrm>
+          <a:prstGeom prst="rect">
+            <a:avLst/>
+          </a:prstGeom>
+          <a:noFill/>
+          <a:extLst>
+            <a:ext uri="{909E8E84-426E-40DD-AFC4-6F175D3DCCD1}">
+              <a14:hiddenFill xmlns:a14="http://schemas.microsoft.com/office/drawing/2010/main">
+                <a:solidFill>
+                  <a:srgbClr val="FFFFFF"/>
+                </a:solidFill>
+              </a14:hiddenFill>
+            </a:ext>
+          </a:extLst>
+        </p:spPr>
+      </p:pic>
+      <p:sp>
+        <p:nvSpPr>
+          <p:cNvPr id="3" name="Rectangle 2"/>
+          <p:cNvSpPr/>
+          <p:nvPr/>
+        </p:nvSpPr>
+        <p:spPr>
+          <a:xfrm>
+            <a:off x="132155" y="1681686"/>
+            <a:ext cx="4030270" cy="369332"/>
+          </a:xfrm>
+          <a:prstGeom prst="rect">
+            <a:avLst/>
+          </a:prstGeom>
+        </p:spPr>
+        <p:txBody>
+          <a:bodyPr wrap="none">
+            <a:spAutoFit/>
+          </a:bodyPr>
+          <a:lstStyle/>
+          <a:p>
+            <a:r>
+              <a:rPr lang="en-US" dirty="0">
+                <a:solidFill>
+                  <a:schemeClr val="bg2"/>
+                </a:solidFill>
+              </a:rPr>
+              <a:t>Ernst Heinrich Weber (1795–1878)</a:t>
+            </a:r>
+          </a:p>
+        </p:txBody>
+      </p:sp>
+      <p:pic>
+        <p:nvPicPr>
+          <p:cNvPr id="9" name="Picture 10" descr="Gustav Fechner - Founder of psychophysics – Genvive"/>
+          <p:cNvPicPr>
+            <a:picLocks noChangeAspect="1" noChangeArrowheads="1"/>
+          </p:cNvPicPr>
+          <p:nvPr/>
+        </p:nvPicPr>
+        <p:blipFill>
+          <a:blip r:embed="rId4">
+            <a:extLst>
+              <a:ext uri="{28A0092B-C50C-407E-A947-70E740481C1C}">
+                <a14:useLocalDpi xmlns:a14="http://schemas.microsoft.com/office/drawing/2010/main" val="0"/>
+              </a:ext>
+            </a:extLst>
+          </a:blip>
+          <a:srcRect/>
+          <a:stretch>
+            <a:fillRect/>
+          </a:stretch>
+        </p:blipFill>
+        <p:spPr bwMode="auto">
+          <a:xfrm>
+            <a:off x="8737133" y="3239902"/>
+            <a:ext cx="3155457" cy="3944322"/>
           </a:xfrm>
           <a:prstGeom prst="rect">
             <a:avLst/>
@@ -5065,31 +5421,7 @@
       </p:pic>
       <p:pic>
         <p:nvPicPr>
-          <p:cNvPr id="5" name="Picture 4"/>
-          <p:cNvPicPr>
-            <a:picLocks noChangeAspect="1"/>
-          </p:cNvPicPr>
-          <p:nvPr/>
-        </p:nvPicPr>
-        <p:blipFill>
-          <a:blip r:embed="rId4"/>
-          <a:stretch>
-            <a:fillRect/>
-          </a:stretch>
-        </p:blipFill>
-        <p:spPr>
-          <a:xfrm>
-            <a:off x="3743325" y="4680655"/>
-            <a:ext cx="2473325" cy="2234671"/>
-          </a:xfrm>
-          <a:prstGeom prst="rect">
-            <a:avLst/>
-          </a:prstGeom>
-        </p:spPr>
-      </p:pic>
-      <p:pic>
-        <p:nvPicPr>
-          <p:cNvPr id="6154" name="Picture 10" descr="A Treatise of Human Nature: Hume, David: Amazon.com: Books"/>
+          <p:cNvPr id="10" name="Picture 2" descr="Psychophysics | in Chapter 04: Senses"/>
           <p:cNvPicPr>
             <a:picLocks noChangeAspect="1" noChangeArrowheads="1"/>
           </p:cNvPicPr>
@@ -5110,8 +5442,8 @@
         </p:blipFill>
         <p:spPr bwMode="auto">
           <a:xfrm>
-            <a:off x="5045263" y="2422297"/>
-            <a:ext cx="3387536" cy="4516715"/>
+            <a:off x="3830306" y="1565461"/>
+            <a:ext cx="3510801" cy="3625008"/>
           </a:xfrm>
           <a:prstGeom prst="rect">
             <a:avLst/>
@@ -5130,116 +5462,38 @@
       </p:pic>
       <p:pic>
         <p:nvPicPr>
-          <p:cNvPr id="6152" name="Picture 8" descr="David Hume - Wikipedia"/>
+          <p:cNvPr id="11" name="Picture 10"/>
           <p:cNvPicPr>
-            <a:picLocks noChangeAspect="1" noChangeArrowheads="1"/>
+            <a:picLocks noChangeAspect="1"/>
           </p:cNvPicPr>
           <p:nvPr/>
         </p:nvPicPr>
         <p:blipFill>
-          <a:blip r:embed="rId6">
-            <a:extLst>
-              <a:ext uri="{28A0092B-C50C-407E-A947-70E740481C1C}">
-                <a14:useLocalDpi xmlns:a14="http://schemas.microsoft.com/office/drawing/2010/main" val="0"/>
-              </a:ext>
-            </a:extLst>
-          </a:blip>
-          <a:srcRect/>
+          <a:blip r:embed="rId6"/>
           <a:stretch>
             <a:fillRect/>
           </a:stretch>
         </p:blipFill>
-        <p:spPr bwMode="auto">
-          <a:xfrm>
-            <a:off x="8432799" y="2192514"/>
-            <a:ext cx="3891416" cy="4771849"/>
-          </a:xfrm>
-          <a:prstGeom prst="rect">
-            <a:avLst/>
-          </a:prstGeom>
-          <a:noFill/>
-          <a:extLst>
-            <a:ext uri="{909E8E84-426E-40DD-AFC4-6F175D3DCCD1}">
-              <a14:hiddenFill xmlns:a14="http://schemas.microsoft.com/office/drawing/2010/main">
-                <a:solidFill>
-                  <a:srgbClr val="FFFFFF"/>
-                </a:solidFill>
-              </a14:hiddenFill>
-            </a:ext>
-          </a:extLst>
-        </p:spPr>
-      </p:pic>
-      <p:sp>
-        <p:nvSpPr>
-          <p:cNvPr id="3" name="Rectangle 2"/>
-          <p:cNvSpPr/>
-          <p:nvPr/>
-        </p:nvSpPr>
         <p:spPr>
           <a:xfrm>
-            <a:off x="9610" y="1978579"/>
-            <a:ext cx="3733714" cy="369332"/>
+            <a:off x="4038600" y="3239902"/>
+            <a:ext cx="5007427" cy="3901135"/>
           </a:xfrm>
           <a:prstGeom prst="rect">
             <a:avLst/>
           </a:prstGeom>
         </p:spPr>
-        <p:txBody>
-          <a:bodyPr wrap="none">
-            <a:spAutoFit/>
-          </a:bodyPr>
-          <a:lstStyle/>
-          <a:p>
-            <a:r>
-              <a:rPr lang="en-US" b="1" dirty="0">
-                <a:solidFill>
-                  <a:schemeClr val="bg2"/>
-                </a:solidFill>
-              </a:rPr>
-              <a:t>William </a:t>
-            </a:r>
-            <a:r>
-              <a:rPr lang="en-US" b="1" dirty="0" err="1">
-                <a:solidFill>
-                  <a:schemeClr val="bg2"/>
-                </a:solidFill>
-              </a:rPr>
-              <a:t>Molyneux</a:t>
-            </a:r>
-            <a:r>
-              <a:rPr lang="en-US" b="1" dirty="0">
-                <a:solidFill>
-                  <a:schemeClr val="bg2"/>
-                </a:solidFill>
-              </a:rPr>
-              <a:t> (1656–1698</a:t>
-            </a:r>
-            <a:r>
-              <a:rPr lang="en-US" b="1" dirty="0" smtClean="0">
-                <a:solidFill>
-                  <a:schemeClr val="bg2"/>
-                </a:solidFill>
-              </a:rPr>
-              <a:t>)</a:t>
-            </a:r>
-            <a:endParaRPr lang="en-US" dirty="0">
-              <a:solidFill>
-                <a:schemeClr val="bg2"/>
-              </a:solidFill>
-            </a:endParaRPr>
-          </a:p>
-        </p:txBody>
-      </p:sp>
-      <p:sp>
-        <p:nvSpPr>
-          <p:cNvPr id="4" name="Rectangle 3"/>
+      </p:pic>
+      <p:sp>
+        <p:nvSpPr>
+          <p:cNvPr id="12" name="Rectangle 11"/>
           <p:cNvSpPr/>
           <p:nvPr/>
         </p:nvSpPr>
         <p:spPr>
           <a:xfrm>
-            <a:off x="9061015" y="1871558"/>
-            <a:ext cx="3130985" cy="369332"/>
+            <a:off x="8231311" y="2477701"/>
+            <a:ext cx="3405099" cy="369332"/>
           </a:xfrm>
           <a:prstGeom prst="rect">
             <a:avLst/>
@@ -5252,33 +5506,20 @@
           <a:lstStyle/>
           <a:p>
             <a:r>
-              <a:rPr lang="en-US" b="1" dirty="0">
+              <a:rPr lang="en-US" dirty="0">
                 <a:solidFill>
                   <a:schemeClr val="bg2"/>
                 </a:solidFill>
               </a:rPr>
-              <a:t>David Hume (1711–1776</a:t>
-            </a:r>
-            <a:r>
-              <a:rPr lang="en-US" b="1" dirty="0" smtClean="0">
-                <a:solidFill>
-                  <a:schemeClr val="bg2"/>
-                </a:solidFill>
-              </a:rPr>
-              <a:t>)</a:t>
-            </a:r>
-            <a:endParaRPr lang="en-US" dirty="0">
-              <a:solidFill>
-                <a:schemeClr val="bg2"/>
-              </a:solidFill>
-            </a:endParaRPr>
+              <a:t>Gustav Fechner (1801–1887)</a:t>
+            </a:r>
           </a:p>
         </p:txBody>
       </p:sp>
     </p:spTree>
     <p:extLst>
       <p:ext uri="{BB962C8B-B14F-4D97-AF65-F5344CB8AC3E}">
-        <p14:creationId xmlns:p14="http://schemas.microsoft.com/office/powerpoint/2010/main" val="83559973"/>
+        <p14:creationId xmlns:p14="http://schemas.microsoft.com/office/powerpoint/2010/main" val="1602044161"/>
       </p:ext>
     </p:extLst>
   </p:cSld>
@@ -5319,7 +5560,7 @@
                                           </p:stCondLst>
                                         </p:cTn>
                                         <p:tgtEl>
-                                          <p:spTgt spid="6146"/>
+                                          <p:spTgt spid="7170"/>
                                         </p:tgtEl>
                                         <p:attrNameLst>
                                           <p:attrName>style.visibility</p:attrName>
@@ -5333,7 +5574,7 @@
                                       <p:cBhvr>
                                         <p:cTn id="7" dur="500"/>
                                         <p:tgtEl>
-                                          <p:spTgt spid="6146"/>
+                                          <p:spTgt spid="7170"/>
                                         </p:tgtEl>
                                       </p:cBhvr>
                                     </p:animEffect>
@@ -5425,7 +5666,7 @@
                                           </p:stCondLst>
                                         </p:cTn>
                                         <p:tgtEl>
-                                          <p:spTgt spid="6150"/>
+                                          <p:spTgt spid="7176"/>
                                         </p:tgtEl>
                                         <p:attrNameLst>
                                           <p:attrName>style.visibility</p:attrName>
@@ -5439,7 +5680,7 @@
                                       <p:cBhvr>
                                         <p:cTn id="17" dur="500"/>
                                         <p:tgtEl>
-                                          <p:spTgt spid="6150"/>
+                                          <p:spTgt spid="7176"/>
                                         </p:tgtEl>
                                       </p:cBhvr>
                                     </p:animEffect>
@@ -5478,7 +5719,7 @@
                                           </p:stCondLst>
                                         </p:cTn>
                                         <p:tgtEl>
-                                          <p:spTgt spid="5"/>
+                                          <p:spTgt spid="9"/>
                                         </p:tgtEl>
                                         <p:attrNameLst>
                                           <p:attrName>style.visibility</p:attrName>
@@ -5492,7 +5733,7 @@
                                       <p:cBhvr>
                                         <p:cTn id="22" dur="500"/>
                                         <p:tgtEl>
-                                          <p:spTgt spid="5"/>
+                                          <p:spTgt spid="9"/>
                                         </p:tgtEl>
                                       </p:cBhvr>
                                     </p:animEffect>
@@ -5518,7 +5759,7 @@
                             </p:stCondLst>
                             <p:childTnLst>
                               <p:par>
-                                <p:cTn id="25" presetID="10" presetClass="entr" presetSubtype="0" fill="hold" nodeType="clickEffect">
+                                <p:cTn id="25" presetID="10" presetClass="entr" presetSubtype="0" fill="hold" grpId="0" nodeType="clickEffect">
                                   <p:stCondLst>
                                     <p:cond delay="0"/>
                                   </p:stCondLst>
@@ -5531,7 +5772,7 @@
                                           </p:stCondLst>
                                         </p:cTn>
                                         <p:tgtEl>
-                                          <p:spTgt spid="6152"/>
+                                          <p:spTgt spid="12"/>
                                         </p:tgtEl>
                                         <p:attrNameLst>
                                           <p:attrName>style.visibility</p:attrName>
@@ -5545,7 +5786,7 @@
                                       <p:cBhvr>
                                         <p:cTn id="27" dur="500"/>
                                         <p:tgtEl>
-                                          <p:spTgt spid="6152"/>
+                                          <p:spTgt spid="12"/>
                                         </p:tgtEl>
                                       </p:cBhvr>
                                     </p:animEffect>
@@ -5571,7 +5812,7 @@
                             </p:stCondLst>
                             <p:childTnLst>
                               <p:par>
-                                <p:cTn id="30" presetID="10" presetClass="entr" presetSubtype="0" fill="hold" grpId="0" nodeType="clickEffect">
+                                <p:cTn id="30" presetID="10" presetClass="entr" presetSubtype="0" fill="hold" nodeType="clickEffect">
                                   <p:stCondLst>
                                     <p:cond delay="0"/>
                                   </p:stCondLst>
@@ -5584,7 +5825,7 @@
                                           </p:stCondLst>
                                         </p:cTn>
                                         <p:tgtEl>
-                                          <p:spTgt spid="4"/>
+                                          <p:spTgt spid="10"/>
                                         </p:tgtEl>
                                         <p:attrNameLst>
                                           <p:attrName>style.visibility</p:attrName>
@@ -5598,7 +5839,7 @@
                                       <p:cBhvr>
                                         <p:cTn id="32" dur="500"/>
                                         <p:tgtEl>
-                                          <p:spTgt spid="4"/>
+                                          <p:spTgt spid="10"/>
                                         </p:tgtEl>
                                       </p:cBhvr>
                                     </p:animEffect>
@@ -5637,7 +5878,7 @@
                                           </p:stCondLst>
                                         </p:cTn>
                                         <p:tgtEl>
-                                          <p:spTgt spid="6154"/>
+                                          <p:spTgt spid="11"/>
                                         </p:tgtEl>
                                         <p:attrNameLst>
                                           <p:attrName>style.visibility</p:attrName>
@@ -5651,7 +5892,7 @@
                                       <p:cBhvr>
                                         <p:cTn id="37" dur="500"/>
                                         <p:tgtEl>
-                                          <p:spTgt spid="6154"/>
+                                          <p:spTgt spid="11"/>
                                         </p:tgtEl>
                                       </p:cBhvr>
                                     </p:animEffect>
@@ -5687,1117 +5928,13 @@
     </p:tnLst>
     <p:bldLst>
       <p:bldP spid="3" grpId="0"/>
-      <p:bldP spid="4" grpId="0"/>
+      <p:bldP spid="12" grpId="0"/>
     </p:bldLst>
   </p:timing>
 </p:sld>
 </file>
 
 <file path=ppt/slides/slide11.xml><?xml version="1.0" encoding="utf-8"?>
-<p:sld xmlns:a="http://schemas.openxmlformats.org/drawingml/2006/main" xmlns:r="http://schemas.openxmlformats.org/officeDocument/2006/relationships" xmlns:p="http://schemas.openxmlformats.org/presentationml/2006/main">
-  <p:cSld>
-    <p:bg>
-      <p:bgPr>
-        <a:solidFill>
-          <a:schemeClr val="bg2">
-            <a:lumMod val="25000"/>
-          </a:schemeClr>
-        </a:solidFill>
-        <a:effectLst/>
-      </p:bgPr>
-    </p:bg>
-    <p:spTree>
-      <p:nvGrpSpPr>
-        <p:cNvPr id="1" name=""/>
-        <p:cNvGrpSpPr/>
-        <p:nvPr/>
-      </p:nvGrpSpPr>
-      <p:grpSpPr>
-        <a:xfrm>
-          <a:off x="0" y="0"/>
-          <a:ext cx="0" cy="0"/>
-          <a:chOff x="0" y="0"/>
-          <a:chExt cx="0" cy="0"/>
-        </a:xfrm>
-      </p:grpSpPr>
-      <p:sp>
-        <p:nvSpPr>
-          <p:cNvPr id="2" name="Title 1"/>
-          <p:cNvSpPr>
-            <a:spLocks noGrp="1"/>
-          </p:cNvSpPr>
-          <p:nvPr>
-            <p:ph type="title"/>
-          </p:nvPr>
-        </p:nvSpPr>
-        <p:spPr/>
-        <p:txBody>
-          <a:bodyPr/>
-          <a:lstStyle/>
-          <a:p>
-            <a:r>
-              <a:rPr lang="en-US" dirty="0" smtClean="0">
-                <a:solidFill>
-                  <a:schemeClr val="bg2"/>
-                </a:solidFill>
-              </a:rPr>
-              <a:t>Pre Scientific revolution – </a:t>
-            </a:r>
-            <a:r>
-              <a:rPr lang="en-US" dirty="0" smtClean="0">
-                <a:solidFill>
-                  <a:schemeClr val="bg2"/>
-                </a:solidFill>
-              </a:rPr>
-              <a:t>1800s </a:t>
-            </a:r>
-            <a:endParaRPr lang="en-US" dirty="0">
-              <a:solidFill>
-                <a:schemeClr val="bg2"/>
-              </a:solidFill>
-            </a:endParaRPr>
-          </a:p>
-        </p:txBody>
-      </p:sp>
-      <p:pic>
-        <p:nvPicPr>
-          <p:cNvPr id="7170" name="Picture 2" descr="Ernst Heinrich Weber - Wikipedia"/>
-          <p:cNvPicPr>
-            <a:picLocks noChangeAspect="1" noChangeArrowheads="1"/>
-          </p:cNvPicPr>
-          <p:nvPr/>
-        </p:nvPicPr>
-        <p:blipFill>
-          <a:blip r:embed="rId2">
-            <a:extLst>
-              <a:ext uri="{28A0092B-C50C-407E-A947-70E740481C1C}">
-                <a14:useLocalDpi xmlns:a14="http://schemas.microsoft.com/office/drawing/2010/main" val="0"/>
-              </a:ext>
-            </a:extLst>
-          </a:blip>
-          <a:srcRect/>
-          <a:stretch>
-            <a:fillRect/>
-          </a:stretch>
-        </p:blipFill>
-        <p:spPr bwMode="auto">
-          <a:xfrm>
-            <a:off x="9059160" y="2757932"/>
-            <a:ext cx="3132840" cy="4100068"/>
-          </a:xfrm>
-          <a:prstGeom prst="rect">
-            <a:avLst/>
-          </a:prstGeom>
-          <a:noFill/>
-          <a:extLst>
-            <a:ext uri="{909E8E84-426E-40DD-AFC4-6F175D3DCCD1}">
-              <a14:hiddenFill xmlns:a14="http://schemas.microsoft.com/office/drawing/2010/main">
-                <a:solidFill>
-                  <a:srgbClr val="FFFFFF"/>
-                </a:solidFill>
-              </a14:hiddenFill>
-            </a:ext>
-          </a:extLst>
-        </p:spPr>
-      </p:pic>
-      <p:pic>
-        <p:nvPicPr>
-          <p:cNvPr id="7176" name="Picture 8" descr="File:CrumeyFig3.pdf"/>
-          <p:cNvPicPr>
-            <a:picLocks noChangeAspect="1" noChangeArrowheads="1"/>
-          </p:cNvPicPr>
-          <p:nvPr/>
-        </p:nvPicPr>
-        <p:blipFill>
-          <a:blip r:embed="rId3">
-            <a:extLst>
-              <a:ext uri="{28A0092B-C50C-407E-A947-70E740481C1C}">
-                <a14:useLocalDpi xmlns:a14="http://schemas.microsoft.com/office/drawing/2010/main" val="0"/>
-              </a:ext>
-            </a:extLst>
-          </a:blip>
-          <a:srcRect/>
-          <a:stretch>
-            <a:fillRect/>
-          </a:stretch>
-        </p:blipFill>
-        <p:spPr bwMode="auto">
-          <a:xfrm>
-            <a:off x="5643008" y="2700490"/>
-            <a:ext cx="3416154" cy="2696018"/>
-          </a:xfrm>
-          <a:prstGeom prst="rect">
-            <a:avLst/>
-          </a:prstGeom>
-          <a:noFill/>
-          <a:extLst>
-            <a:ext uri="{909E8E84-426E-40DD-AFC4-6F175D3DCCD1}">
-              <a14:hiddenFill xmlns:a14="http://schemas.microsoft.com/office/drawing/2010/main">
-                <a:solidFill>
-                  <a:srgbClr val="FFFFFF"/>
-                </a:solidFill>
-              </a14:hiddenFill>
-            </a:ext>
-          </a:extLst>
-        </p:spPr>
-      </p:pic>
-      <p:sp>
-        <p:nvSpPr>
-          <p:cNvPr id="6" name="Rectangle 5"/>
-          <p:cNvSpPr/>
-          <p:nvPr/>
-        </p:nvSpPr>
-        <p:spPr>
-          <a:xfrm>
-            <a:off x="0" y="2476508"/>
-            <a:ext cx="3377848" cy="369332"/>
-          </a:xfrm>
-          <a:prstGeom prst="rect">
-            <a:avLst/>
-          </a:prstGeom>
-        </p:spPr>
-        <p:txBody>
-          <a:bodyPr wrap="none">
-            <a:spAutoFit/>
-          </a:bodyPr>
-          <a:lstStyle/>
-          <a:p>
-            <a:r>
-              <a:rPr lang="en-US" dirty="0">
-                <a:solidFill>
-                  <a:schemeClr val="bg2"/>
-                </a:solidFill>
-              </a:rPr>
-              <a:t>Immanuel Kant (1724–1804)</a:t>
-            </a:r>
-          </a:p>
-        </p:txBody>
-      </p:sp>
-      <p:sp>
-        <p:nvSpPr>
-          <p:cNvPr id="3" name="Rectangle 2"/>
-          <p:cNvSpPr/>
-          <p:nvPr/>
-        </p:nvSpPr>
-        <p:spPr>
-          <a:xfrm>
-            <a:off x="8161730" y="2291842"/>
-            <a:ext cx="4030270" cy="369332"/>
-          </a:xfrm>
-          <a:prstGeom prst="rect">
-            <a:avLst/>
-          </a:prstGeom>
-        </p:spPr>
-        <p:txBody>
-          <a:bodyPr wrap="none">
-            <a:spAutoFit/>
-          </a:bodyPr>
-          <a:lstStyle/>
-          <a:p>
-            <a:r>
-              <a:rPr lang="en-US" dirty="0">
-                <a:solidFill>
-                  <a:schemeClr val="bg2"/>
-                </a:solidFill>
-              </a:rPr>
-              <a:t>Ernst Heinrich Weber (1795–1878)</a:t>
-            </a:r>
-          </a:p>
-        </p:txBody>
-      </p:sp>
-      <p:pic>
-        <p:nvPicPr>
-          <p:cNvPr id="2050" name="Picture 2" descr="Immanuel Kant - Wikipedia"/>
-          <p:cNvPicPr>
-            <a:picLocks noChangeAspect="1" noChangeArrowheads="1"/>
-          </p:cNvPicPr>
-          <p:nvPr/>
-        </p:nvPicPr>
-        <p:blipFill>
-          <a:blip r:embed="rId4" cstate="print">
-            <a:extLst>
-              <a:ext uri="{28A0092B-C50C-407E-A947-70E740481C1C}">
-                <a14:useLocalDpi xmlns:a14="http://schemas.microsoft.com/office/drawing/2010/main" val="0"/>
-              </a:ext>
-            </a:extLst>
-          </a:blip>
-          <a:srcRect/>
-          <a:stretch>
-            <a:fillRect/>
-          </a:stretch>
-        </p:blipFill>
-        <p:spPr bwMode="auto">
-          <a:xfrm>
-            <a:off x="0" y="3149679"/>
-            <a:ext cx="2841625" cy="3708321"/>
-          </a:xfrm>
-          <a:prstGeom prst="rect">
-            <a:avLst/>
-          </a:prstGeom>
-          <a:noFill/>
-          <a:extLst>
-            <a:ext uri="{909E8E84-426E-40DD-AFC4-6F175D3DCCD1}">
-              <a14:hiddenFill xmlns:a14="http://schemas.microsoft.com/office/drawing/2010/main">
-                <a:solidFill>
-                  <a:srgbClr val="FFFFFF"/>
-                </a:solidFill>
-              </a14:hiddenFill>
-            </a:ext>
-          </a:extLst>
-        </p:spPr>
-      </p:pic>
-      <p:pic>
-        <p:nvPicPr>
-          <p:cNvPr id="4" name="Picture 3"/>
-          <p:cNvPicPr>
-            <a:picLocks noChangeAspect="1"/>
-          </p:cNvPicPr>
-          <p:nvPr/>
-        </p:nvPicPr>
-        <p:blipFill>
-          <a:blip r:embed="rId5"/>
-          <a:stretch>
-            <a:fillRect/>
-          </a:stretch>
-        </p:blipFill>
-        <p:spPr>
-          <a:xfrm>
-            <a:off x="2801383" y="5334000"/>
-            <a:ext cx="6257778" cy="1577816"/>
-          </a:xfrm>
-          <a:prstGeom prst="rect">
-            <a:avLst/>
-          </a:prstGeom>
-        </p:spPr>
-      </p:pic>
-    </p:spTree>
-    <p:extLst>
-      <p:ext uri="{BB962C8B-B14F-4D97-AF65-F5344CB8AC3E}">
-        <p14:creationId xmlns:p14="http://schemas.microsoft.com/office/powerpoint/2010/main" val="1602044161"/>
-      </p:ext>
-    </p:extLst>
-  </p:cSld>
-  <p:clrMapOvr>
-    <a:masterClrMapping/>
-  </p:clrMapOvr>
-  <p:timing>
-    <p:tnLst>
-      <p:par>
-        <p:cTn id="1" dur="indefinite" restart="never" nodeType="tmRoot">
-          <p:childTnLst>
-            <p:seq concurrent="1" nextAc="seek">
-              <p:cTn id="2" dur="indefinite" nodeType="mainSeq">
-                <p:childTnLst>
-                  <p:par>
-                    <p:cTn id="3" fill="hold">
-                      <p:stCondLst>
-                        <p:cond delay="indefinite"/>
-                      </p:stCondLst>
-                      <p:childTnLst>
-                        <p:par>
-                          <p:cTn id="4" fill="hold">
-                            <p:stCondLst>
-                              <p:cond delay="0"/>
-                            </p:stCondLst>
-                            <p:childTnLst>
-                              <p:par>
-                                <p:cTn id="5" presetID="10" presetClass="entr" presetSubtype="0" fill="hold" nodeType="clickEffect">
-                                  <p:stCondLst>
-                                    <p:cond delay="0"/>
-                                  </p:stCondLst>
-                                  <p:childTnLst>
-                                    <p:set>
-                                      <p:cBhvr>
-                                        <p:cTn id="6" dur="1" fill="hold">
-                                          <p:stCondLst>
-                                            <p:cond delay="0"/>
-                                          </p:stCondLst>
-                                        </p:cTn>
-                                        <p:tgtEl>
-                                          <p:spTgt spid="2050"/>
-                                        </p:tgtEl>
-                                        <p:attrNameLst>
-                                          <p:attrName>style.visibility</p:attrName>
-                                        </p:attrNameLst>
-                                      </p:cBhvr>
-                                      <p:to>
-                                        <p:strVal val="visible"/>
-                                      </p:to>
-                                    </p:set>
-                                    <p:animEffect transition="in" filter="fade">
-                                      <p:cBhvr>
-                                        <p:cTn id="7" dur="500"/>
-                                        <p:tgtEl>
-                                          <p:spTgt spid="2050"/>
-                                        </p:tgtEl>
-                                      </p:cBhvr>
-                                    </p:animEffect>
-                                  </p:childTnLst>
-                                </p:cTn>
-                              </p:par>
-                            </p:childTnLst>
-                          </p:cTn>
-                        </p:par>
-                      </p:childTnLst>
-                    </p:cTn>
-                  </p:par>
-                  <p:par>
-                    <p:cTn id="8" fill="hold">
-                      <p:stCondLst>
-                        <p:cond delay="indefinite"/>
-                      </p:stCondLst>
-                      <p:childTnLst>
-                        <p:par>
-                          <p:cTn id="9" fill="hold">
-                            <p:stCondLst>
-                              <p:cond delay="0"/>
-                            </p:stCondLst>
-                            <p:childTnLst>
-                              <p:par>
-                                <p:cTn id="10" presetID="10" presetClass="entr" presetSubtype="0" fill="hold" grpId="0" nodeType="clickEffect">
-                                  <p:stCondLst>
-                                    <p:cond delay="0"/>
-                                  </p:stCondLst>
-                                  <p:childTnLst>
-                                    <p:set>
-                                      <p:cBhvr>
-                                        <p:cTn id="11" dur="1" fill="hold">
-                                          <p:stCondLst>
-                                            <p:cond delay="0"/>
-                                          </p:stCondLst>
-                                        </p:cTn>
-                                        <p:tgtEl>
-                                          <p:spTgt spid="6"/>
-                                        </p:tgtEl>
-                                        <p:attrNameLst>
-                                          <p:attrName>style.visibility</p:attrName>
-                                        </p:attrNameLst>
-                                      </p:cBhvr>
-                                      <p:to>
-                                        <p:strVal val="visible"/>
-                                      </p:to>
-                                    </p:set>
-                                    <p:animEffect transition="in" filter="fade">
-                                      <p:cBhvr>
-                                        <p:cTn id="12" dur="500"/>
-                                        <p:tgtEl>
-                                          <p:spTgt spid="6"/>
-                                        </p:tgtEl>
-                                      </p:cBhvr>
-                                    </p:animEffect>
-                                  </p:childTnLst>
-                                </p:cTn>
-                              </p:par>
-                            </p:childTnLst>
-                          </p:cTn>
-                        </p:par>
-                      </p:childTnLst>
-                    </p:cTn>
-                  </p:par>
-                  <p:par>
-                    <p:cTn id="13" fill="hold">
-                      <p:stCondLst>
-                        <p:cond delay="indefinite"/>
-                      </p:stCondLst>
-                      <p:childTnLst>
-                        <p:par>
-                          <p:cTn id="14" fill="hold">
-                            <p:stCondLst>
-                              <p:cond delay="0"/>
-                            </p:stCondLst>
-                            <p:childTnLst>
-                              <p:par>
-                                <p:cTn id="15" presetID="10" presetClass="entr" presetSubtype="0" fill="hold" nodeType="clickEffect">
-                                  <p:stCondLst>
-                                    <p:cond delay="0"/>
-                                  </p:stCondLst>
-                                  <p:childTnLst>
-                                    <p:set>
-                                      <p:cBhvr>
-                                        <p:cTn id="16" dur="1" fill="hold">
-                                          <p:stCondLst>
-                                            <p:cond delay="0"/>
-                                          </p:stCondLst>
-                                        </p:cTn>
-                                        <p:tgtEl>
-                                          <p:spTgt spid="4"/>
-                                        </p:tgtEl>
-                                        <p:attrNameLst>
-                                          <p:attrName>style.visibility</p:attrName>
-                                        </p:attrNameLst>
-                                      </p:cBhvr>
-                                      <p:to>
-                                        <p:strVal val="visible"/>
-                                      </p:to>
-                                    </p:set>
-                                    <p:animEffect transition="in" filter="fade">
-                                      <p:cBhvr>
-                                        <p:cTn id="17" dur="500"/>
-                                        <p:tgtEl>
-                                          <p:spTgt spid="4"/>
-                                        </p:tgtEl>
-                                      </p:cBhvr>
-                                    </p:animEffect>
-                                  </p:childTnLst>
-                                </p:cTn>
-                              </p:par>
-                            </p:childTnLst>
-                          </p:cTn>
-                        </p:par>
-                      </p:childTnLst>
-                    </p:cTn>
-                  </p:par>
-                  <p:par>
-                    <p:cTn id="18" fill="hold">
-                      <p:stCondLst>
-                        <p:cond delay="indefinite"/>
-                      </p:stCondLst>
-                      <p:childTnLst>
-                        <p:par>
-                          <p:cTn id="19" fill="hold">
-                            <p:stCondLst>
-                              <p:cond delay="0"/>
-                            </p:stCondLst>
-                            <p:childTnLst>
-                              <p:par>
-                                <p:cTn id="20" presetID="10" presetClass="entr" presetSubtype="0" fill="hold" nodeType="clickEffect">
-                                  <p:stCondLst>
-                                    <p:cond delay="0"/>
-                                  </p:stCondLst>
-                                  <p:childTnLst>
-                                    <p:set>
-                                      <p:cBhvr>
-                                        <p:cTn id="21" dur="1" fill="hold">
-                                          <p:stCondLst>
-                                            <p:cond delay="0"/>
-                                          </p:stCondLst>
-                                        </p:cTn>
-                                        <p:tgtEl>
-                                          <p:spTgt spid="7170"/>
-                                        </p:tgtEl>
-                                        <p:attrNameLst>
-                                          <p:attrName>style.visibility</p:attrName>
-                                        </p:attrNameLst>
-                                      </p:cBhvr>
-                                      <p:to>
-                                        <p:strVal val="visible"/>
-                                      </p:to>
-                                    </p:set>
-                                    <p:animEffect transition="in" filter="fade">
-                                      <p:cBhvr>
-                                        <p:cTn id="22" dur="500"/>
-                                        <p:tgtEl>
-                                          <p:spTgt spid="7170"/>
-                                        </p:tgtEl>
-                                      </p:cBhvr>
-                                    </p:animEffect>
-                                  </p:childTnLst>
-                                </p:cTn>
-                              </p:par>
-                            </p:childTnLst>
-                          </p:cTn>
-                        </p:par>
-                      </p:childTnLst>
-                    </p:cTn>
-                  </p:par>
-                  <p:par>
-                    <p:cTn id="23" fill="hold">
-                      <p:stCondLst>
-                        <p:cond delay="indefinite"/>
-                      </p:stCondLst>
-                      <p:childTnLst>
-                        <p:par>
-                          <p:cTn id="24" fill="hold">
-                            <p:stCondLst>
-                              <p:cond delay="0"/>
-                            </p:stCondLst>
-                            <p:childTnLst>
-                              <p:par>
-                                <p:cTn id="25" presetID="10" presetClass="entr" presetSubtype="0" fill="hold" grpId="0" nodeType="clickEffect">
-                                  <p:stCondLst>
-                                    <p:cond delay="0"/>
-                                  </p:stCondLst>
-                                  <p:childTnLst>
-                                    <p:set>
-                                      <p:cBhvr>
-                                        <p:cTn id="26" dur="1" fill="hold">
-                                          <p:stCondLst>
-                                            <p:cond delay="0"/>
-                                          </p:stCondLst>
-                                        </p:cTn>
-                                        <p:tgtEl>
-                                          <p:spTgt spid="3"/>
-                                        </p:tgtEl>
-                                        <p:attrNameLst>
-                                          <p:attrName>style.visibility</p:attrName>
-                                        </p:attrNameLst>
-                                      </p:cBhvr>
-                                      <p:to>
-                                        <p:strVal val="visible"/>
-                                      </p:to>
-                                    </p:set>
-                                    <p:animEffect transition="in" filter="fade">
-                                      <p:cBhvr>
-                                        <p:cTn id="27" dur="500"/>
-                                        <p:tgtEl>
-                                          <p:spTgt spid="3"/>
-                                        </p:tgtEl>
-                                      </p:cBhvr>
-                                    </p:animEffect>
-                                  </p:childTnLst>
-                                </p:cTn>
-                              </p:par>
-                            </p:childTnLst>
-                          </p:cTn>
-                        </p:par>
-                      </p:childTnLst>
-                    </p:cTn>
-                  </p:par>
-                  <p:par>
-                    <p:cTn id="28" fill="hold">
-                      <p:stCondLst>
-                        <p:cond delay="indefinite"/>
-                      </p:stCondLst>
-                      <p:childTnLst>
-                        <p:par>
-                          <p:cTn id="29" fill="hold">
-                            <p:stCondLst>
-                              <p:cond delay="0"/>
-                            </p:stCondLst>
-                            <p:childTnLst>
-                              <p:par>
-                                <p:cTn id="30" presetID="10" presetClass="entr" presetSubtype="0" fill="hold" nodeType="clickEffect">
-                                  <p:stCondLst>
-                                    <p:cond delay="0"/>
-                                  </p:stCondLst>
-                                  <p:childTnLst>
-                                    <p:set>
-                                      <p:cBhvr>
-                                        <p:cTn id="31" dur="1" fill="hold">
-                                          <p:stCondLst>
-                                            <p:cond delay="0"/>
-                                          </p:stCondLst>
-                                        </p:cTn>
-                                        <p:tgtEl>
-                                          <p:spTgt spid="7176"/>
-                                        </p:tgtEl>
-                                        <p:attrNameLst>
-                                          <p:attrName>style.visibility</p:attrName>
-                                        </p:attrNameLst>
-                                      </p:cBhvr>
-                                      <p:to>
-                                        <p:strVal val="visible"/>
-                                      </p:to>
-                                    </p:set>
-                                    <p:animEffect transition="in" filter="fade">
-                                      <p:cBhvr>
-                                        <p:cTn id="32" dur="500"/>
-                                        <p:tgtEl>
-                                          <p:spTgt spid="7176"/>
-                                        </p:tgtEl>
-                                      </p:cBhvr>
-                                    </p:animEffect>
-                                  </p:childTnLst>
-                                </p:cTn>
-                              </p:par>
-                            </p:childTnLst>
-                          </p:cTn>
-                        </p:par>
-                      </p:childTnLst>
-                    </p:cTn>
-                  </p:par>
-                </p:childTnLst>
-              </p:cTn>
-              <p:prevCondLst>
-                <p:cond evt="onPrev" delay="0">
-                  <p:tgtEl>
-                    <p:sldTgt/>
-                  </p:tgtEl>
-                </p:cond>
-              </p:prevCondLst>
-              <p:nextCondLst>
-                <p:cond evt="onNext" delay="0">
-                  <p:tgtEl>
-                    <p:sldTgt/>
-                  </p:tgtEl>
-                </p:cond>
-              </p:nextCondLst>
-            </p:seq>
-          </p:childTnLst>
-        </p:cTn>
-      </p:par>
-    </p:tnLst>
-    <p:bldLst>
-      <p:bldP spid="6" grpId="0"/>
-      <p:bldP spid="3" grpId="0"/>
-    </p:bldLst>
-  </p:timing>
-</p:sld>
-</file>
-
-<file path=ppt/slides/slide12.xml><?xml version="1.0" encoding="utf-8"?>
-<p:sld xmlns:a="http://schemas.openxmlformats.org/drawingml/2006/main" xmlns:r="http://schemas.openxmlformats.org/officeDocument/2006/relationships" xmlns:p="http://schemas.openxmlformats.org/presentationml/2006/main">
-  <p:cSld>
-    <p:bg>
-      <p:bgPr>
-        <a:solidFill>
-          <a:schemeClr val="bg2">
-            <a:lumMod val="25000"/>
-          </a:schemeClr>
-        </a:solidFill>
-        <a:effectLst/>
-      </p:bgPr>
-    </p:bg>
-    <p:spTree>
-      <p:nvGrpSpPr>
-        <p:cNvPr id="1" name=""/>
-        <p:cNvGrpSpPr/>
-        <p:nvPr/>
-      </p:nvGrpSpPr>
-      <p:grpSpPr>
-        <a:xfrm>
-          <a:off x="0" y="0"/>
-          <a:ext cx="0" cy="0"/>
-          <a:chOff x="0" y="0"/>
-          <a:chExt cx="0" cy="0"/>
-        </a:xfrm>
-      </p:grpSpPr>
-      <p:sp>
-        <p:nvSpPr>
-          <p:cNvPr id="2" name="Title 1"/>
-          <p:cNvSpPr>
-            <a:spLocks noGrp="1"/>
-          </p:cNvSpPr>
-          <p:nvPr>
-            <p:ph type="title"/>
-          </p:nvPr>
-        </p:nvSpPr>
-        <p:spPr/>
-        <p:txBody>
-          <a:bodyPr/>
-          <a:lstStyle/>
-          <a:p>
-            <a:r>
-              <a:rPr lang="en-US" dirty="0" smtClean="0">
-                <a:solidFill>
-                  <a:schemeClr val="bg2"/>
-                </a:solidFill>
-              </a:rPr>
-              <a:t>Pre Scientific revolution – </a:t>
-            </a:r>
-            <a:r>
-              <a:rPr lang="en-US" dirty="0" smtClean="0">
-                <a:solidFill>
-                  <a:schemeClr val="bg2"/>
-                </a:solidFill>
-              </a:rPr>
-              <a:t>1800s</a:t>
-            </a:r>
-            <a:endParaRPr lang="en-US" dirty="0">
-              <a:solidFill>
-                <a:schemeClr val="bg2"/>
-              </a:solidFill>
-            </a:endParaRPr>
-          </a:p>
-        </p:txBody>
-      </p:sp>
-      <p:pic>
-        <p:nvPicPr>
-          <p:cNvPr id="7178" name="Picture 10" descr="Gustav Fechner - Founder of psychophysics – Genvive"/>
-          <p:cNvPicPr>
-            <a:picLocks noChangeAspect="1" noChangeArrowheads="1"/>
-          </p:cNvPicPr>
-          <p:nvPr/>
-        </p:nvPicPr>
-        <p:blipFill>
-          <a:blip r:embed="rId2">
-            <a:extLst>
-              <a:ext uri="{28A0092B-C50C-407E-A947-70E740481C1C}">
-                <a14:useLocalDpi xmlns:a14="http://schemas.microsoft.com/office/drawing/2010/main" val="0"/>
-              </a:ext>
-            </a:extLst>
-          </a:blip>
-          <a:srcRect/>
-          <a:stretch>
-            <a:fillRect/>
-          </a:stretch>
-        </p:blipFill>
-        <p:spPr bwMode="auto">
-          <a:xfrm>
-            <a:off x="8847858" y="2418408"/>
-            <a:ext cx="3155457" cy="3944322"/>
-          </a:xfrm>
-          <a:prstGeom prst="rect">
-            <a:avLst/>
-          </a:prstGeom>
-          <a:noFill/>
-          <a:extLst>
-            <a:ext uri="{909E8E84-426E-40DD-AFC4-6F175D3DCCD1}">
-              <a14:hiddenFill xmlns:a14="http://schemas.microsoft.com/office/drawing/2010/main">
-                <a:solidFill>
-                  <a:srgbClr val="FFFFFF"/>
-                </a:solidFill>
-              </a14:hiddenFill>
-            </a:ext>
-          </a:extLst>
-        </p:spPr>
-      </p:pic>
-      <p:pic>
-        <p:nvPicPr>
-          <p:cNvPr id="8194" name="Picture 2" descr="Psychophysics | in Chapter 04: Senses"/>
-          <p:cNvPicPr>
-            <a:picLocks noChangeAspect="1" noChangeArrowheads="1"/>
-          </p:cNvPicPr>
-          <p:nvPr/>
-        </p:nvPicPr>
-        <p:blipFill>
-          <a:blip r:embed="rId3">
-            <a:extLst>
-              <a:ext uri="{28A0092B-C50C-407E-A947-70E740481C1C}">
-                <a14:useLocalDpi xmlns:a14="http://schemas.microsoft.com/office/drawing/2010/main" val="0"/>
-              </a:ext>
-            </a:extLst>
-          </a:blip>
-          <a:srcRect/>
-          <a:stretch>
-            <a:fillRect/>
-          </a:stretch>
-        </p:blipFill>
-        <p:spPr bwMode="auto">
-          <a:xfrm>
-            <a:off x="141452" y="2537387"/>
-            <a:ext cx="3510801" cy="3625008"/>
-          </a:xfrm>
-          <a:prstGeom prst="rect">
-            <a:avLst/>
-          </a:prstGeom>
-          <a:noFill/>
-          <a:extLst>
-            <a:ext uri="{909E8E84-426E-40DD-AFC4-6F175D3DCCD1}">
-              <a14:hiddenFill xmlns:a14="http://schemas.microsoft.com/office/drawing/2010/main">
-                <a:solidFill>
-                  <a:srgbClr val="FFFFFF"/>
-                </a:solidFill>
-              </a14:hiddenFill>
-            </a:ext>
-          </a:extLst>
-        </p:spPr>
-      </p:pic>
-      <p:pic>
-        <p:nvPicPr>
-          <p:cNvPr id="3" name="Picture 2"/>
-          <p:cNvPicPr>
-            <a:picLocks noChangeAspect="1"/>
-          </p:cNvPicPr>
-          <p:nvPr/>
-        </p:nvPicPr>
-        <p:blipFill>
-          <a:blip r:embed="rId4"/>
-          <a:stretch>
-            <a:fillRect/>
-          </a:stretch>
-        </p:blipFill>
-        <p:spPr>
-          <a:xfrm>
-            <a:off x="3746342" y="2440001"/>
-            <a:ext cx="5007427" cy="3901135"/>
-          </a:xfrm>
-          <a:prstGeom prst="rect">
-            <a:avLst/>
-          </a:prstGeom>
-        </p:spPr>
-      </p:pic>
-      <p:sp>
-        <p:nvSpPr>
-          <p:cNvPr id="4" name="Rectangle 3"/>
-          <p:cNvSpPr/>
-          <p:nvPr/>
-        </p:nvSpPr>
-        <p:spPr>
-          <a:xfrm>
-            <a:off x="8723036" y="2049076"/>
-            <a:ext cx="3405099" cy="369332"/>
-          </a:xfrm>
-          <a:prstGeom prst="rect">
-            <a:avLst/>
-          </a:prstGeom>
-        </p:spPr>
-        <p:txBody>
-          <a:bodyPr wrap="none">
-            <a:spAutoFit/>
-          </a:bodyPr>
-          <a:lstStyle/>
-          <a:p>
-            <a:r>
-              <a:rPr lang="en-US" dirty="0">
-                <a:solidFill>
-                  <a:schemeClr val="bg2"/>
-                </a:solidFill>
-              </a:rPr>
-              <a:t>Gustav Fechner (1801–1887)</a:t>
-            </a:r>
-          </a:p>
-        </p:txBody>
-      </p:sp>
-    </p:spTree>
-    <p:extLst>
-      <p:ext uri="{BB962C8B-B14F-4D97-AF65-F5344CB8AC3E}">
-        <p14:creationId xmlns:p14="http://schemas.microsoft.com/office/powerpoint/2010/main" val="2251601830"/>
-      </p:ext>
-    </p:extLst>
-  </p:cSld>
-  <p:clrMapOvr>
-    <a:masterClrMapping/>
-  </p:clrMapOvr>
-  <p:timing>
-    <p:tnLst>
-      <p:par>
-        <p:cTn id="1" dur="indefinite" restart="never" nodeType="tmRoot">
-          <p:childTnLst>
-            <p:seq concurrent="1" nextAc="seek">
-              <p:cTn id="2" dur="indefinite" nodeType="mainSeq">
-                <p:childTnLst>
-                  <p:par>
-                    <p:cTn id="3" fill="hold">
-                      <p:stCondLst>
-                        <p:cond delay="indefinite"/>
-                      </p:stCondLst>
-                      <p:childTnLst>
-                        <p:par>
-                          <p:cTn id="4" fill="hold">
-                            <p:stCondLst>
-                              <p:cond delay="0"/>
-                            </p:stCondLst>
-                            <p:childTnLst>
-                              <p:par>
-                                <p:cTn id="5" presetID="10" presetClass="entr" presetSubtype="0" fill="hold" nodeType="clickEffect">
-                                  <p:stCondLst>
-                                    <p:cond delay="0"/>
-                                  </p:stCondLst>
-                                  <p:childTnLst>
-                                    <p:set>
-                                      <p:cBhvr>
-                                        <p:cTn id="6" dur="1" fill="hold">
-                                          <p:stCondLst>
-                                            <p:cond delay="0"/>
-                                          </p:stCondLst>
-                                        </p:cTn>
-                                        <p:tgtEl>
-                                          <p:spTgt spid="7178"/>
-                                        </p:tgtEl>
-                                        <p:attrNameLst>
-                                          <p:attrName>style.visibility</p:attrName>
-                                        </p:attrNameLst>
-                                      </p:cBhvr>
-                                      <p:to>
-                                        <p:strVal val="visible"/>
-                                      </p:to>
-                                    </p:set>
-                                    <p:animEffect transition="in" filter="fade">
-                                      <p:cBhvr>
-                                        <p:cTn id="7" dur="500"/>
-                                        <p:tgtEl>
-                                          <p:spTgt spid="7178"/>
-                                        </p:tgtEl>
-                                      </p:cBhvr>
-                                    </p:animEffect>
-                                  </p:childTnLst>
-                                </p:cTn>
-                              </p:par>
-                            </p:childTnLst>
-                          </p:cTn>
-                        </p:par>
-                      </p:childTnLst>
-                    </p:cTn>
-                  </p:par>
-                  <p:par>
-                    <p:cTn id="8" fill="hold">
-                      <p:stCondLst>
-                        <p:cond delay="indefinite"/>
-                      </p:stCondLst>
-                      <p:childTnLst>
-                        <p:par>
-                          <p:cTn id="9" fill="hold">
-                            <p:stCondLst>
-                              <p:cond delay="0"/>
-                            </p:stCondLst>
-                            <p:childTnLst>
-                              <p:par>
-                                <p:cTn id="10" presetID="10" presetClass="entr" presetSubtype="0" fill="hold" grpId="0" nodeType="clickEffect">
-                                  <p:stCondLst>
-                                    <p:cond delay="0"/>
-                                  </p:stCondLst>
-                                  <p:childTnLst>
-                                    <p:set>
-                                      <p:cBhvr>
-                                        <p:cTn id="11" dur="1" fill="hold">
-                                          <p:stCondLst>
-                                            <p:cond delay="0"/>
-                                          </p:stCondLst>
-                                        </p:cTn>
-                                        <p:tgtEl>
-                                          <p:spTgt spid="4"/>
-                                        </p:tgtEl>
-                                        <p:attrNameLst>
-                                          <p:attrName>style.visibility</p:attrName>
-                                        </p:attrNameLst>
-                                      </p:cBhvr>
-                                      <p:to>
-                                        <p:strVal val="visible"/>
-                                      </p:to>
-                                    </p:set>
-                                    <p:animEffect transition="in" filter="fade">
-                                      <p:cBhvr>
-                                        <p:cTn id="12" dur="500"/>
-                                        <p:tgtEl>
-                                          <p:spTgt spid="4"/>
-                                        </p:tgtEl>
-                                      </p:cBhvr>
-                                    </p:animEffect>
-                                  </p:childTnLst>
-                                </p:cTn>
-                              </p:par>
-                            </p:childTnLst>
-                          </p:cTn>
-                        </p:par>
-                      </p:childTnLst>
-                    </p:cTn>
-                  </p:par>
-                  <p:par>
-                    <p:cTn id="13" fill="hold">
-                      <p:stCondLst>
-                        <p:cond delay="indefinite"/>
-                      </p:stCondLst>
-                      <p:childTnLst>
-                        <p:par>
-                          <p:cTn id="14" fill="hold">
-                            <p:stCondLst>
-                              <p:cond delay="0"/>
-                            </p:stCondLst>
-                            <p:childTnLst>
-                              <p:par>
-                                <p:cTn id="15" presetID="10" presetClass="entr" presetSubtype="0" fill="hold" nodeType="clickEffect">
-                                  <p:stCondLst>
-                                    <p:cond delay="0"/>
-                                  </p:stCondLst>
-                                  <p:childTnLst>
-                                    <p:set>
-                                      <p:cBhvr>
-                                        <p:cTn id="16" dur="1" fill="hold">
-                                          <p:stCondLst>
-                                            <p:cond delay="0"/>
-                                          </p:stCondLst>
-                                        </p:cTn>
-                                        <p:tgtEl>
-                                          <p:spTgt spid="8194"/>
-                                        </p:tgtEl>
-                                        <p:attrNameLst>
-                                          <p:attrName>style.visibility</p:attrName>
-                                        </p:attrNameLst>
-                                      </p:cBhvr>
-                                      <p:to>
-                                        <p:strVal val="visible"/>
-                                      </p:to>
-                                    </p:set>
-                                    <p:animEffect transition="in" filter="fade">
-                                      <p:cBhvr>
-                                        <p:cTn id="17" dur="500"/>
-                                        <p:tgtEl>
-                                          <p:spTgt spid="8194"/>
-                                        </p:tgtEl>
-                                      </p:cBhvr>
-                                    </p:animEffect>
-                                  </p:childTnLst>
-                                </p:cTn>
-                              </p:par>
-                            </p:childTnLst>
-                          </p:cTn>
-                        </p:par>
-                      </p:childTnLst>
-                    </p:cTn>
-                  </p:par>
-                  <p:par>
-                    <p:cTn id="18" fill="hold">
-                      <p:stCondLst>
-                        <p:cond delay="indefinite"/>
-                      </p:stCondLst>
-                      <p:childTnLst>
-                        <p:par>
-                          <p:cTn id="19" fill="hold">
-                            <p:stCondLst>
-                              <p:cond delay="0"/>
-                            </p:stCondLst>
-                            <p:childTnLst>
-                              <p:par>
-                                <p:cTn id="20" presetID="10" presetClass="entr" presetSubtype="0" fill="hold" nodeType="clickEffect">
-                                  <p:stCondLst>
-                                    <p:cond delay="0"/>
-                                  </p:stCondLst>
-                                  <p:childTnLst>
-                                    <p:set>
-                                      <p:cBhvr>
-                                        <p:cTn id="21" dur="1" fill="hold">
-                                          <p:stCondLst>
-                                            <p:cond delay="0"/>
-                                          </p:stCondLst>
-                                        </p:cTn>
-                                        <p:tgtEl>
-                                          <p:spTgt spid="3"/>
-                                        </p:tgtEl>
-                                        <p:attrNameLst>
-                                          <p:attrName>style.visibility</p:attrName>
-                                        </p:attrNameLst>
-                                      </p:cBhvr>
-                                      <p:to>
-                                        <p:strVal val="visible"/>
-                                      </p:to>
-                                    </p:set>
-                                    <p:animEffect transition="in" filter="fade">
-                                      <p:cBhvr>
-                                        <p:cTn id="22" dur="500"/>
-                                        <p:tgtEl>
-                                          <p:spTgt spid="3"/>
-                                        </p:tgtEl>
-                                      </p:cBhvr>
-                                    </p:animEffect>
-                                  </p:childTnLst>
-                                </p:cTn>
-                              </p:par>
-                            </p:childTnLst>
-                          </p:cTn>
-                        </p:par>
-                      </p:childTnLst>
-                    </p:cTn>
-                  </p:par>
-                </p:childTnLst>
-              </p:cTn>
-              <p:prevCondLst>
-                <p:cond evt="onPrev" delay="0">
-                  <p:tgtEl>
-                    <p:sldTgt/>
-                  </p:tgtEl>
-                </p:cond>
-              </p:prevCondLst>
-              <p:nextCondLst>
-                <p:cond evt="onNext" delay="0">
-                  <p:tgtEl>
-                    <p:sldTgt/>
-                  </p:tgtEl>
-                </p:cond>
-              </p:nextCondLst>
-            </p:seq>
-          </p:childTnLst>
-        </p:cTn>
-      </p:par>
-    </p:tnLst>
-    <p:bldLst>
-      <p:bldP spid="4" grpId="0"/>
-    </p:bldLst>
-  </p:timing>
-</p:sld>
-</file>
-
-<file path=ppt/slides/slide13.xml><?xml version="1.0" encoding="utf-8"?>
 <p:sld xmlns:a="http://schemas.openxmlformats.org/drawingml/2006/main" xmlns:r="http://schemas.openxmlformats.org/officeDocument/2006/relationships" xmlns:p="http://schemas.openxmlformats.org/presentationml/2006/main">
   <p:cSld>
     <p:bg>
@@ -6845,7 +5982,15 @@
                   <a:schemeClr val="bg2"/>
                 </a:solidFill>
               </a:rPr>
-              <a:t>1800s onwards</a:t>
+              <a:t>1850s </a:t>
+            </a:r>
+            <a:r>
+              <a:rPr lang="en-US" dirty="0" smtClean="0">
+                <a:solidFill>
+                  <a:schemeClr val="bg2"/>
+                </a:solidFill>
+              </a:rPr>
+              <a:t>onwards</a:t>
             </a:r>
             <a:endParaRPr lang="en-US" dirty="0">
               <a:solidFill>
@@ -6957,7 +6102,7 @@
 </p:sld>
 </file>
 
-<file path=ppt/slides/slide14.xml><?xml version="1.0" encoding="utf-8"?>
+<file path=ppt/slides/slide12.xml><?xml version="1.0" encoding="utf-8"?>
 <p:sld xmlns:a="http://schemas.openxmlformats.org/drawingml/2006/main" xmlns:r="http://schemas.openxmlformats.org/officeDocument/2006/relationships" xmlns:p="http://schemas.openxmlformats.org/presentationml/2006/main">
   <p:cSld>
     <p:bg>
@@ -7005,7 +6150,15 @@
                   <a:schemeClr val="bg2"/>
                 </a:solidFill>
               </a:rPr>
-              <a:t>1800s onwards</a:t>
+              <a:t>1800s </a:t>
+            </a:r>
+            <a:r>
+              <a:rPr lang="en-US" dirty="0" smtClean="0">
+                <a:solidFill>
+                  <a:schemeClr val="bg2"/>
+                </a:solidFill>
+              </a:rPr>
+              <a:t>onwards – PSYCHOLOGY!</a:t>
             </a:r>
             <a:endParaRPr lang="en-US" dirty="0">
               <a:solidFill>
@@ -7024,7 +6177,7 @@
           <p:nvPr/>
         </p:nvPicPr>
         <p:blipFill>
-          <a:blip r:embed="rId2">
+          <a:blip r:embed="rId3">
             <a:extLst>
               <a:ext uri="{28A0092B-C50C-407E-A947-70E740481C1C}">
                 <a14:useLocalDpi xmlns:a14="http://schemas.microsoft.com/office/drawing/2010/main" val="0"/>
@@ -7038,8 +6191,8 @@
         </p:blipFill>
         <p:spPr bwMode="auto">
           <a:xfrm>
-            <a:off x="0" y="2377712"/>
-            <a:ext cx="3497943" cy="4480288"/>
+            <a:off x="1" y="3417612"/>
+            <a:ext cx="2686050" cy="3440387"/>
           </a:xfrm>
           <a:prstGeom prst="rect">
             <a:avLst/>
@@ -7065,7 +6218,7 @@
           <p:nvPr/>
         </p:nvPicPr>
         <p:blipFill>
-          <a:blip r:embed="rId3" cstate="print">
+          <a:blip r:embed="rId4" cstate="print">
             <a:extLst>
               <a:ext uri="{28A0092B-C50C-407E-A947-70E740481C1C}">
                 <a14:useLocalDpi xmlns:a14="http://schemas.microsoft.com/office/drawing/2010/main" val="0"/>
@@ -7079,8 +6232,8 @@
         </p:blipFill>
         <p:spPr bwMode="auto">
           <a:xfrm>
-            <a:off x="3497943" y="1638250"/>
-            <a:ext cx="3188607" cy="5219749"/>
+            <a:off x="2686051" y="3409950"/>
+            <a:ext cx="2106322" cy="3448049"/>
           </a:xfrm>
           <a:prstGeom prst="rect">
             <a:avLst/>
@@ -7106,7 +6259,7 @@
           <p:nvPr/>
         </p:nvPicPr>
         <p:blipFill>
-          <a:blip r:embed="rId4">
+          <a:blip r:embed="rId5">
             <a:extLst>
               <a:ext uri="{28A0092B-C50C-407E-A947-70E740481C1C}">
                 <a14:useLocalDpi xmlns:a14="http://schemas.microsoft.com/office/drawing/2010/main" val="0"/>
@@ -7120,8 +6273,8 @@
         </p:blipFill>
         <p:spPr bwMode="auto">
           <a:xfrm>
-            <a:off x="8229599" y="3984891"/>
-            <a:ext cx="4295775" cy="3291638"/>
+            <a:off x="6649962" y="4189825"/>
+            <a:ext cx="3482119" cy="2668174"/>
           </a:xfrm>
           <a:prstGeom prst="rect">
             <a:avLst/>
@@ -7147,7 +6300,7 @@
           <p:nvPr/>
         </p:nvPicPr>
         <p:blipFill>
-          <a:blip r:embed="rId5">
+          <a:blip r:embed="rId6">
             <a:extLst>
               <a:ext uri="{28A0092B-C50C-407E-A947-70E740481C1C}">
                 <a14:useLocalDpi xmlns:a14="http://schemas.microsoft.com/office/drawing/2010/main" val="0"/>
@@ -7161,8 +6314,90 @@
         </p:blipFill>
         <p:spPr bwMode="auto">
           <a:xfrm>
-            <a:off x="6686550" y="2261061"/>
-            <a:ext cx="3200400" cy="4596940"/>
+            <a:off x="4792373" y="4189825"/>
+            <a:ext cx="1857589" cy="2668175"/>
+          </a:xfrm>
+          <a:prstGeom prst="rect">
+            <a:avLst/>
+          </a:prstGeom>
+          <a:noFill/>
+          <a:extLst>
+            <a:ext uri="{909E8E84-426E-40DD-AFC4-6F175D3DCCD1}">
+              <a14:hiddenFill xmlns:a14="http://schemas.microsoft.com/office/drawing/2010/main">
+                <a:solidFill>
+                  <a:srgbClr val="FFFFFF"/>
+                </a:solidFill>
+              </a14:hiddenFill>
+            </a:ext>
+          </a:extLst>
+        </p:spPr>
+      </p:pic>
+      <p:pic>
+        <p:nvPicPr>
+          <p:cNvPr id="1026" name="Picture 2" descr="Max Wertheimer: Gestalt Theory Founder — Gestalt Therapy Blog"/>
+          <p:cNvPicPr>
+            <a:picLocks noChangeAspect="1" noChangeArrowheads="1"/>
+          </p:cNvPicPr>
+          <p:nvPr/>
+        </p:nvPicPr>
+        <p:blipFill>
+          <a:blip r:embed="rId7">
+            <a:extLst>
+              <a:ext uri="{28A0092B-C50C-407E-A947-70E740481C1C}">
+                <a14:useLocalDpi xmlns:a14="http://schemas.microsoft.com/office/drawing/2010/main" val="0"/>
+              </a:ext>
+            </a:extLst>
+          </a:blip>
+          <a:srcRect/>
+          <a:stretch>
+            <a:fillRect/>
+          </a:stretch>
+        </p:blipFill>
+        <p:spPr bwMode="auto">
+          <a:xfrm>
+            <a:off x="4792373" y="1834780"/>
+            <a:ext cx="4199227" cy="2432053"/>
+          </a:xfrm>
+          <a:prstGeom prst="rect">
+            <a:avLst/>
+          </a:prstGeom>
+          <a:noFill/>
+          <a:extLst>
+            <a:ext uri="{909E8E84-426E-40DD-AFC4-6F175D3DCCD1}">
+              <a14:hiddenFill xmlns:a14="http://schemas.microsoft.com/office/drawing/2010/main">
+                <a:solidFill>
+                  <a:srgbClr val="FFFFFF"/>
+                </a:solidFill>
+              </a14:hiddenFill>
+            </a:ext>
+          </a:extLst>
+        </p:spPr>
+      </p:pic>
+      <p:pic>
+        <p:nvPicPr>
+          <p:cNvPr id="1030" name="Picture 6" descr="How Optical Illusions Work | CooperVision"/>
+          <p:cNvPicPr>
+            <a:picLocks noChangeAspect="1" noChangeArrowheads="1"/>
+          </p:cNvPicPr>
+          <p:nvPr/>
+        </p:nvPicPr>
+        <p:blipFill>
+          <a:blip r:embed="rId8">
+            <a:extLst>
+              <a:ext uri="{28A0092B-C50C-407E-A947-70E740481C1C}">
+                <a14:useLocalDpi xmlns:a14="http://schemas.microsoft.com/office/drawing/2010/main" val="0"/>
+              </a:ext>
+            </a:extLst>
+          </a:blip>
+          <a:srcRect/>
+          <a:stretch>
+            <a:fillRect/>
+          </a:stretch>
+        </p:blipFill>
+        <p:spPr bwMode="auto">
+          <a:xfrm>
+            <a:off x="8991601" y="1066431"/>
+            <a:ext cx="3200400" cy="3200401"/>
           </a:xfrm>
           <a:prstGeom prst="rect">
             <a:avLst/>
@@ -7199,7 +6434,7 @@
 </p:sld>
 </file>
 
-<file path=ppt/slides/slide15.xml><?xml version="1.0" encoding="utf-8"?>
+<file path=ppt/slides/slide13.xml><?xml version="1.0" encoding="utf-8"?>
 <p:sld xmlns:a="http://schemas.openxmlformats.org/drawingml/2006/main" xmlns:r="http://schemas.openxmlformats.org/officeDocument/2006/relationships" xmlns:p="http://schemas.openxmlformats.org/presentationml/2006/main">
   <p:cSld>
     <p:bg>
@@ -7472,7 +6707,7 @@
 </p:sld>
 </file>
 
-<file path=ppt/slides/slide16.xml><?xml version="1.0" encoding="utf-8"?>
+<file path=ppt/slides/slide14.xml><?xml version="1.0" encoding="utf-8"?>
 <p:sld xmlns:a="http://schemas.openxmlformats.org/drawingml/2006/main" xmlns:r="http://schemas.openxmlformats.org/officeDocument/2006/relationships" xmlns:p="http://schemas.openxmlformats.org/presentationml/2006/main">
   <p:cSld>
     <p:bg>
@@ -7641,7 +6876,7 @@
 </p:sld>
 </file>
 
-<file path=ppt/slides/slide17.xml><?xml version="1.0" encoding="utf-8"?>
+<file path=ppt/slides/slide15.xml><?xml version="1.0" encoding="utf-8"?>
 <p:sld xmlns:a="http://schemas.openxmlformats.org/drawingml/2006/main" xmlns:r="http://schemas.openxmlformats.org/officeDocument/2006/relationships" xmlns:p="http://schemas.openxmlformats.org/presentationml/2006/main">
   <p:cSld>
     <p:bg>
@@ -8149,7 +7384,7 @@
 </p:sld>
 </file>
 
-<file path=ppt/slides/slide18.xml><?xml version="1.0" encoding="utf-8"?>
+<file path=ppt/slides/slide16.xml><?xml version="1.0" encoding="utf-8"?>
 <p:sld xmlns:a="http://schemas.openxmlformats.org/drawingml/2006/main" xmlns:r="http://schemas.openxmlformats.org/officeDocument/2006/relationships" xmlns:p="http://schemas.openxmlformats.org/presentationml/2006/main">
   <p:cSld>
     <p:bg>
@@ -8438,7 +7673,7 @@
 </p:sld>
 </file>
 
-<file path=ppt/slides/slide19.xml><?xml version="1.0" encoding="utf-8"?>
+<file path=ppt/slides/slide17.xml><?xml version="1.0" encoding="utf-8"?>
 <p:sld xmlns:a="http://schemas.openxmlformats.org/drawingml/2006/main" xmlns:r="http://schemas.openxmlformats.org/officeDocument/2006/relationships" xmlns:p="http://schemas.openxmlformats.org/presentationml/2006/main">
   <p:cSld>
     <p:spTree>
@@ -8804,18 +8039,25 @@
             <p:ph type="title"/>
           </p:nvPr>
         </p:nvSpPr>
-        <p:spPr/>
-        <p:txBody>
-          <a:bodyPr/>
+        <p:spPr>
+          <a:xfrm>
+            <a:off x="1024128" y="391886"/>
+            <a:ext cx="9720072" cy="2084832"/>
+          </a:xfrm>
+        </p:spPr>
+        <p:txBody>
+          <a:bodyPr>
+            <a:normAutofit/>
+          </a:bodyPr>
           <a:lstStyle/>
           <a:p>
             <a:r>
-              <a:rPr lang="en-US" b="1" dirty="0" smtClean="0">
+              <a:rPr lang="en-US" sz="5400" b="1" dirty="0">
                 <a:solidFill>
                   <a:srgbClr val="7030A0"/>
                 </a:solidFill>
               </a:rPr>
-              <a:t>Warning</a:t>
+              <a:t>Background Color indicates progression through time </a:t>
             </a:r>
             <a:endParaRPr lang="en-US" b="1" dirty="0">
               <a:solidFill>
@@ -8827,91 +8069,13 @@
       </p:sp>
       <p:sp>
         <p:nvSpPr>
-          <p:cNvPr id="3" name="Content Placeholder 2"/>
-          <p:cNvSpPr>
-            <a:spLocks noGrp="1"/>
-          </p:cNvSpPr>
-          <p:nvPr>
-            <p:ph idx="1"/>
-          </p:nvPr>
-        </p:nvSpPr>
-        <p:spPr>
-          <a:xfrm>
-            <a:off x="1024128" y="1593666"/>
-            <a:ext cx="9720073" cy="4023360"/>
-          </a:xfrm>
-          <a:solidFill>
-            <a:srgbClr val="FFC000"/>
-          </a:solidFill>
-        </p:spPr>
-        <p:txBody>
-          <a:bodyPr>
-            <a:normAutofit/>
-          </a:bodyPr>
-          <a:lstStyle/>
-          <a:p>
-            <a:r>
-              <a:rPr lang="en-US" sz="3200" b="1" dirty="0" smtClean="0">
-                <a:solidFill>
-                  <a:srgbClr val="7030A0"/>
-                </a:solidFill>
-              </a:rPr>
-              <a:t>- Background Color indicates progression through time </a:t>
-            </a:r>
-            <a:endParaRPr lang="en-US" sz="3200" b="1" dirty="0">
-              <a:solidFill>
-                <a:srgbClr val="7030A0"/>
-              </a:solidFill>
-            </a:endParaRPr>
-          </a:p>
-          <a:p>
-            <a:r>
-              <a:rPr lang="en-US" sz="2000" b="1" dirty="0" smtClean="0">
-                <a:solidFill>
-                  <a:srgbClr val="7030A0"/>
-                </a:solidFill>
-              </a:rPr>
-              <a:t>- black = past</a:t>
-            </a:r>
-          </a:p>
-          <a:p>
-            <a:r>
-              <a:rPr lang="en-US" sz="2000" b="1" dirty="0" smtClean="0">
-                <a:solidFill>
-                  <a:srgbClr val="7030A0"/>
-                </a:solidFill>
-              </a:rPr>
-              <a:t>- shades of blue = recent history</a:t>
-            </a:r>
-          </a:p>
-          <a:p>
-            <a:r>
-              <a:rPr lang="en-US" sz="2000" b="1" dirty="0" smtClean="0">
-                <a:solidFill>
-                  <a:srgbClr val="7030A0"/>
-                </a:solidFill>
-              </a:rPr>
-              <a:t>- white = now</a:t>
-            </a:r>
-          </a:p>
-          <a:p>
-            <a:endParaRPr lang="en-US" sz="2000" b="1" dirty="0">
-              <a:solidFill>
-                <a:srgbClr val="7030A0"/>
-              </a:solidFill>
-            </a:endParaRPr>
-          </a:p>
-        </p:txBody>
-      </p:sp>
-      <p:sp>
-        <p:nvSpPr>
           <p:cNvPr id="4" name="Rectangle 3"/>
           <p:cNvSpPr/>
           <p:nvPr/>
         </p:nvSpPr>
         <p:spPr>
           <a:xfrm>
-            <a:off x="1024128" y="4153992"/>
+            <a:off x="1103957" y="2913021"/>
             <a:ext cx="3038421" cy="2704011"/>
           </a:xfrm>
           <a:prstGeom prst="rect">
@@ -8963,7 +8127,7 @@
         </p:nvSpPr>
         <p:spPr>
           <a:xfrm>
-            <a:off x="4364953" y="4153989"/>
+            <a:off x="4444782" y="2913018"/>
             <a:ext cx="3038421" cy="2704011"/>
           </a:xfrm>
           <a:prstGeom prst="rect">
@@ -9015,7 +8179,7 @@
         </p:nvSpPr>
         <p:spPr>
           <a:xfrm>
-            <a:off x="7705779" y="4153989"/>
+            <a:off x="7785608" y="2913018"/>
             <a:ext cx="3038421" cy="2704011"/>
           </a:xfrm>
           <a:prstGeom prst="rect">
@@ -10406,7 +9570,6 @@
               <a:rPr lang="en-US" b="1" dirty="0"/>
               <a:t>Distinction Between Sensation and Perception</a:t>
             </a:r>
-            <a:endParaRPr lang="en-US" b="1" dirty="0"/>
           </a:p>
         </p:txBody>
       </p:sp>
@@ -11010,7 +10173,7 @@
                             </p:stCondLst>
                             <p:childTnLst>
                               <p:par>
-                                <p:cTn id="55" presetID="10" presetClass="entr" presetSubtype="0" fill="hold" grpId="0" nodeType="clickEffect">
+                                <p:cTn id="55" presetID="10" presetClass="entr" presetSubtype="0" fill="hold" nodeType="clickEffect">
                                   <p:stCondLst>
                                     <p:cond delay="0"/>
                                   </p:stCondLst>
@@ -11023,7 +10186,7 @@
                                           </p:stCondLst>
                                         </p:cTn>
                                         <p:tgtEl>
-                                          <p:spTgt spid="16"/>
+                                          <p:spTgt spid="9"/>
                                         </p:tgtEl>
                                         <p:attrNameLst>
                                           <p:attrName>style.visibility</p:attrName>
@@ -11037,7 +10200,7 @@
                                       <p:cBhvr>
                                         <p:cTn id="57" dur="500"/>
                                         <p:tgtEl>
-                                          <p:spTgt spid="16"/>
+                                          <p:spTgt spid="9"/>
                                         </p:tgtEl>
                                       </p:cBhvr>
                                     </p:animEffect>
@@ -11063,7 +10226,7 @@
                             </p:stCondLst>
                             <p:childTnLst>
                               <p:par>
-                                <p:cTn id="60" presetID="10" presetClass="entr" presetSubtype="0" fill="hold" nodeType="clickEffect">
+                                <p:cTn id="60" presetID="10" presetClass="entr" presetSubtype="0" fill="hold" grpId="0" nodeType="clickEffect">
                                   <p:stCondLst>
                                     <p:cond delay="0"/>
                                   </p:stCondLst>
@@ -11071,6 +10234,59 @@
                                     <p:set>
                                       <p:cBhvr>
                                         <p:cTn id="61" dur="1" fill="hold">
+                                          <p:stCondLst>
+                                            <p:cond delay="0"/>
+                                          </p:stCondLst>
+                                        </p:cTn>
+                                        <p:tgtEl>
+                                          <p:spTgt spid="16"/>
+                                        </p:tgtEl>
+                                        <p:attrNameLst>
+                                          <p:attrName>style.visibility</p:attrName>
+                                        </p:attrNameLst>
+                                      </p:cBhvr>
+                                      <p:to>
+                                        <p:strVal val="visible"/>
+                                      </p:to>
+                                    </p:set>
+                                    <p:animEffect transition="in" filter="fade">
+                                      <p:cBhvr>
+                                        <p:cTn id="62" dur="500"/>
+                                        <p:tgtEl>
+                                          <p:spTgt spid="16"/>
+                                        </p:tgtEl>
+                                      </p:cBhvr>
+                                    </p:animEffect>
+                                  </p:childTnLst>
+                                </p:cTn>
+                              </p:par>
+                            </p:childTnLst>
+                          </p:cTn>
+                        </p:par>
+                      </p:childTnLst>
+                    </p:cTn>
+                  </p:par>
+                  <p:par>
+                    <p:cTn id="63" fill="hold">
+                      <p:stCondLst>
+                        <p:cond delay="indefinite"/>
+                      </p:stCondLst>
+                      <p:childTnLst>
+                        <p:par>
+                          <p:cTn id="64" fill="hold">
+                            <p:stCondLst>
+                              <p:cond delay="0"/>
+                            </p:stCondLst>
+                            <p:childTnLst>
+                              <p:par>
+                                <p:cTn id="65" presetID="10" presetClass="entr" presetSubtype="0" fill="hold" nodeType="clickEffect">
+                                  <p:stCondLst>
+                                    <p:cond delay="0"/>
+                                  </p:stCondLst>
+                                  <p:childTnLst>
+                                    <p:set>
+                                      <p:cBhvr>
+                                        <p:cTn id="66" dur="1" fill="hold">
                                           <p:stCondLst>
                                             <p:cond delay="0"/>
                                           </p:stCondLst>
@@ -11088,7 +10304,7 @@
                                     </p:set>
                                     <p:animEffect transition="in" filter="fade">
                                       <p:cBhvr>
-                                        <p:cTn id="62" dur="500"/>
+                                        <p:cTn id="67" dur="500"/>
                                         <p:tgtEl>
                                           <p:spTgt spid="19"/>
                                         </p:tgtEl>
@@ -11098,14 +10314,14 @@
                                 </p:cTn>
                               </p:par>
                               <p:par>
-                                <p:cTn id="63" presetID="10" presetClass="entr" presetSubtype="0" fill="hold" nodeType="withEffect">
+                                <p:cTn id="68" presetID="10" presetClass="entr" presetSubtype="0" fill="hold" nodeType="withEffect">
                                   <p:stCondLst>
                                     <p:cond delay="0"/>
                                   </p:stCondLst>
                                   <p:childTnLst>
                                     <p:set>
                                       <p:cBhvr>
-                                        <p:cTn id="64" dur="1" fill="hold">
+                                        <p:cTn id="69" dur="1" fill="hold">
                                           <p:stCondLst>
                                             <p:cond delay="0"/>
                                           </p:stCondLst>
@@ -11123,62 +10339,9 @@
                                     </p:set>
                                     <p:animEffect transition="in" filter="fade">
                                       <p:cBhvr>
-                                        <p:cTn id="65" dur="500"/>
+                                        <p:cTn id="70" dur="500"/>
                                         <p:tgtEl>
                                           <p:spTgt spid="17"/>
-                                        </p:tgtEl>
-                                      </p:cBhvr>
-                                    </p:animEffect>
-                                  </p:childTnLst>
-                                </p:cTn>
-                              </p:par>
-                            </p:childTnLst>
-                          </p:cTn>
-                        </p:par>
-                      </p:childTnLst>
-                    </p:cTn>
-                  </p:par>
-                  <p:par>
-                    <p:cTn id="66" fill="hold">
-                      <p:stCondLst>
-                        <p:cond delay="indefinite"/>
-                      </p:stCondLst>
-                      <p:childTnLst>
-                        <p:par>
-                          <p:cTn id="67" fill="hold">
-                            <p:stCondLst>
-                              <p:cond delay="0"/>
-                            </p:stCondLst>
-                            <p:childTnLst>
-                              <p:par>
-                                <p:cTn id="68" presetID="10" presetClass="entr" presetSubtype="0" fill="hold" grpId="0" nodeType="clickEffect">
-                                  <p:stCondLst>
-                                    <p:cond delay="0"/>
-                                  </p:stCondLst>
-                                  <p:childTnLst>
-                                    <p:set>
-                                      <p:cBhvr>
-                                        <p:cTn id="69" dur="1" fill="hold">
-                                          <p:stCondLst>
-                                            <p:cond delay="0"/>
-                                          </p:stCondLst>
-                                        </p:cTn>
-                                        <p:tgtEl>
-                                          <p:spTgt spid="20"/>
-                                        </p:tgtEl>
-                                        <p:attrNameLst>
-                                          <p:attrName>style.visibility</p:attrName>
-                                        </p:attrNameLst>
-                                      </p:cBhvr>
-                                      <p:to>
-                                        <p:strVal val="visible"/>
-                                      </p:to>
-                                    </p:set>
-                                    <p:animEffect transition="in" filter="fade">
-                                      <p:cBhvr>
-                                        <p:cTn id="70" dur="500"/>
-                                        <p:tgtEl>
-                                          <p:spTgt spid="20"/>
                                         </p:tgtEl>
                                       </p:cBhvr>
                                     </p:animEffect>
@@ -11217,6 +10380,59 @@
                                           </p:stCondLst>
                                         </p:cTn>
                                         <p:tgtEl>
+                                          <p:spTgt spid="20"/>
+                                        </p:tgtEl>
+                                        <p:attrNameLst>
+                                          <p:attrName>style.visibility</p:attrName>
+                                        </p:attrNameLst>
+                                      </p:cBhvr>
+                                      <p:to>
+                                        <p:strVal val="visible"/>
+                                      </p:to>
+                                    </p:set>
+                                    <p:animEffect transition="in" filter="fade">
+                                      <p:cBhvr>
+                                        <p:cTn id="75" dur="500"/>
+                                        <p:tgtEl>
+                                          <p:spTgt spid="20"/>
+                                        </p:tgtEl>
+                                      </p:cBhvr>
+                                    </p:animEffect>
+                                  </p:childTnLst>
+                                </p:cTn>
+                              </p:par>
+                            </p:childTnLst>
+                          </p:cTn>
+                        </p:par>
+                      </p:childTnLst>
+                    </p:cTn>
+                  </p:par>
+                  <p:par>
+                    <p:cTn id="76" fill="hold">
+                      <p:stCondLst>
+                        <p:cond delay="indefinite"/>
+                      </p:stCondLst>
+                      <p:childTnLst>
+                        <p:par>
+                          <p:cTn id="77" fill="hold">
+                            <p:stCondLst>
+                              <p:cond delay="0"/>
+                            </p:stCondLst>
+                            <p:childTnLst>
+                              <p:par>
+                                <p:cTn id="78" presetID="10" presetClass="entr" presetSubtype="0" fill="hold" grpId="0" nodeType="clickEffect">
+                                  <p:stCondLst>
+                                    <p:cond delay="0"/>
+                                  </p:stCondLst>
+                                  <p:childTnLst>
+                                    <p:set>
+                                      <p:cBhvr>
+                                        <p:cTn id="79" dur="1" fill="hold">
+                                          <p:stCondLst>
+                                            <p:cond delay="0"/>
+                                          </p:stCondLst>
+                                        </p:cTn>
+                                        <p:tgtEl>
                                           <p:spTgt spid="18"/>
                                         </p:tgtEl>
                                         <p:attrNameLst>
@@ -11229,7 +10445,7 @@
                                     </p:set>
                                     <p:animEffect transition="in" filter="fade">
                                       <p:cBhvr>
-                                        <p:cTn id="75" dur="500"/>
+                                        <p:cTn id="80" dur="500"/>
                                         <p:tgtEl>
                                           <p:spTgt spid="18"/>
                                         </p:tgtEl>
@@ -11613,15 +10829,7 @@
                   <a:schemeClr val="bg1"/>
                 </a:solidFill>
               </a:rPr>
-              <a:t>Ibn </a:t>
-            </a:r>
-            <a:r>
-              <a:rPr lang="en-US" sz="3600" dirty="0" smtClean="0">
-                <a:solidFill>
-                  <a:schemeClr val="bg1"/>
-                </a:solidFill>
-              </a:rPr>
-              <a:t>Al-Haytham (1000 CE)</a:t>
+              <a:t>Ibn Al-Haytham (1000 CE)</a:t>
             </a:r>
             <a:endParaRPr lang="en-US" sz="3600" dirty="0"/>
           </a:p>
@@ -12269,7 +11477,7 @@
       </p:pic>
       <p:pic>
         <p:nvPicPr>
-          <p:cNvPr id="6" name="Picture 4" descr="undefined"/>
+          <p:cNvPr id="7" name="Picture 2" descr="undefined"/>
           <p:cNvPicPr>
             <a:picLocks noChangeAspect="1" noChangeArrowheads="1"/>
           </p:cNvPicPr>
@@ -12290,48 +11498,7 @@
         </p:blipFill>
         <p:spPr bwMode="auto">
           <a:xfrm>
-            <a:off x="645746" y="2084832"/>
-            <a:ext cx="756763" cy="1012466"/>
-          </a:xfrm>
-          <a:prstGeom prst="rect">
-            <a:avLst/>
-          </a:prstGeom>
-          <a:noFill/>
-          <a:extLst>
-            <a:ext uri="{909E8E84-426E-40DD-AFC4-6F175D3DCCD1}">
-              <a14:hiddenFill xmlns:a14="http://schemas.microsoft.com/office/drawing/2010/main">
-                <a:solidFill>
-                  <a:srgbClr val="FFFFFF"/>
-                </a:solidFill>
-              </a14:hiddenFill>
-            </a:ext>
-          </a:extLst>
-        </p:spPr>
-      </p:pic>
-      <p:pic>
-        <p:nvPicPr>
-          <p:cNvPr id="7" name="Picture 2" descr="undefined"/>
-          <p:cNvPicPr>
-            <a:picLocks noChangeAspect="1" noChangeArrowheads="1"/>
-          </p:cNvPicPr>
-          <p:nvPr/>
-        </p:nvPicPr>
-        <p:blipFill>
-          <a:blip r:embed="rId5" cstate="print">
-            <a:extLst>
-              <a:ext uri="{28A0092B-C50C-407E-A947-70E740481C1C}">
-                <a14:useLocalDpi xmlns:a14="http://schemas.microsoft.com/office/drawing/2010/main" val="0"/>
-              </a:ext>
-            </a:extLst>
-          </a:blip>
-          <a:srcRect/>
-          <a:stretch>
-            <a:fillRect/>
-          </a:stretch>
-        </p:blipFill>
-        <p:spPr bwMode="auto">
-          <a:xfrm>
-            <a:off x="88901" y="2835275"/>
+            <a:off x="2188741" y="5834940"/>
             <a:ext cx="762000" cy="1142999"/>
           </a:xfrm>
           <a:prstGeom prst="rect">
@@ -12357,8 +11524,8 @@
         </p:nvSpPr>
         <p:spPr>
           <a:xfrm>
-            <a:off x="2216003" y="1581149"/>
-            <a:ext cx="4999973" cy="3403600"/>
+            <a:off x="1758700" y="2295547"/>
+            <a:ext cx="2532393" cy="1723860"/>
           </a:xfrm>
           <a:prstGeom prst="cloud">
             <a:avLst/>
@@ -12400,7 +11567,7 @@
         </p:nvSpPr>
         <p:spPr>
           <a:xfrm rot="21225809">
-            <a:off x="2966297" y="2275387"/>
+            <a:off x="2122996" y="2576800"/>
             <a:ext cx="1522500" cy="369332"/>
           </a:xfrm>
           <a:prstGeom prst="rect">
@@ -12430,7 +11597,7 @@
         </p:nvSpPr>
         <p:spPr>
           <a:xfrm rot="21225809">
-            <a:off x="2733282" y="2796904"/>
+            <a:off x="2615389" y="2878087"/>
             <a:ext cx="1522500" cy="923330"/>
           </a:xfrm>
           <a:prstGeom prst="rect">
@@ -12460,14 +11627,116 @@
       </p:sp>
       <p:pic>
         <p:nvPicPr>
-          <p:cNvPr id="5126" name="Picture 6" descr="Mind–body dualism - Wikipedia"/>
+          <p:cNvPr id="5" name="Picture 4"/>
+          <p:cNvPicPr>
+            <a:picLocks noChangeAspect="1"/>
+          </p:cNvPicPr>
+          <p:nvPr/>
+        </p:nvPicPr>
+        <p:blipFill>
+          <a:blip r:embed="rId5"/>
+          <a:stretch>
+            <a:fillRect/>
+          </a:stretch>
+        </p:blipFill>
+        <p:spPr>
+          <a:xfrm>
+            <a:off x="5817664" y="5196571"/>
+            <a:ext cx="1833252" cy="1781368"/>
+          </a:xfrm>
+          <a:prstGeom prst="rect">
+            <a:avLst/>
+          </a:prstGeom>
+        </p:spPr>
+      </p:pic>
+      <p:sp>
+        <p:nvSpPr>
+          <p:cNvPr id="8" name="Rectangle 7"/>
+          <p:cNvSpPr/>
+          <p:nvPr/>
+        </p:nvSpPr>
+        <p:spPr>
+          <a:xfrm>
+            <a:off x="-26860" y="1807359"/>
+            <a:ext cx="2846048" cy="954107"/>
+          </a:xfrm>
+          <a:prstGeom prst="rect">
+            <a:avLst/>
+          </a:prstGeom>
+        </p:spPr>
+        <p:txBody>
+          <a:bodyPr wrap="square">
+            <a:spAutoFit/>
+          </a:bodyPr>
+          <a:lstStyle/>
+          <a:p>
+            <a:r>
+              <a:rPr lang="en-US" sz="2800" dirty="0">
+                <a:solidFill>
+                  <a:schemeClr val="bg2"/>
+                </a:solidFill>
+              </a:rPr>
+              <a:t>René Descartes (1596–1650</a:t>
+            </a:r>
+            <a:r>
+              <a:rPr lang="en-US" sz="2800" dirty="0" smtClean="0">
+                <a:solidFill>
+                  <a:schemeClr val="bg2"/>
+                </a:solidFill>
+              </a:rPr>
+              <a:t>)</a:t>
+            </a:r>
+            <a:endParaRPr lang="en-US" sz="2800" dirty="0">
+              <a:solidFill>
+                <a:schemeClr val="bg2"/>
+              </a:solidFill>
+            </a:endParaRPr>
+          </a:p>
+        </p:txBody>
+      </p:sp>
+      <p:sp>
+        <p:nvSpPr>
+          <p:cNvPr id="11" name="Rectangle 10"/>
+          <p:cNvSpPr/>
+          <p:nvPr/>
+        </p:nvSpPr>
+        <p:spPr>
+          <a:xfrm>
+            <a:off x="7861109" y="2391777"/>
+            <a:ext cx="2409486" cy="954107"/>
+          </a:xfrm>
+          <a:prstGeom prst="rect">
+            <a:avLst/>
+          </a:prstGeom>
+        </p:spPr>
+        <p:txBody>
+          <a:bodyPr wrap="square">
+            <a:spAutoFit/>
+          </a:bodyPr>
+          <a:lstStyle/>
+          <a:p>
+            <a:pPr algn="r"/>
+            <a:r>
+              <a:rPr lang="en-US" sz="2800" dirty="0">
+                <a:solidFill>
+                  <a:schemeClr val="bg2"/>
+                </a:solidFill>
+              </a:rPr>
+              <a:t>John Locke (1632–1704)</a:t>
+            </a:r>
+          </a:p>
+        </p:txBody>
+      </p:sp>
+      <p:pic>
+        <p:nvPicPr>
+          <p:cNvPr id="14" name="Picture 2" descr="William Molyneux - Wikipedia"/>
           <p:cNvPicPr>
             <a:picLocks noChangeAspect="1" noChangeArrowheads="1"/>
           </p:cNvPicPr>
           <p:nvPr/>
         </p:nvPicPr>
         <p:blipFill>
-          <a:blip r:embed="rId6" cstate="print">
+          <a:blip r:embed="rId6">
             <a:extLst>
               <a:ext uri="{28A0092B-C50C-407E-A947-70E740481C1C}">
                 <a14:useLocalDpi xmlns:a14="http://schemas.microsoft.com/office/drawing/2010/main" val="0"/>
@@ -12481,8 +11750,8 @@
         </p:blipFill>
         <p:spPr bwMode="auto">
           <a:xfrm>
-            <a:off x="4504353" y="2024506"/>
-            <a:ext cx="1916710" cy="2367701"/>
+            <a:off x="3214880" y="3707252"/>
+            <a:ext cx="2677603" cy="3183373"/>
           </a:xfrm>
           <a:prstGeom prst="rect">
             <a:avLst/>
@@ -12501,7 +11770,7 @@
       </p:pic>
       <p:pic>
         <p:nvPicPr>
-          <p:cNvPr id="5" name="Picture 4"/>
+          <p:cNvPr id="16" name="Picture 15"/>
           <p:cNvPicPr>
             <a:picLocks noChangeAspect="1"/>
           </p:cNvPicPr>
@@ -12515,24 +11784,94 @@
         </p:blipFill>
         <p:spPr>
           <a:xfrm>
-            <a:off x="6622574" y="4392207"/>
-            <a:ext cx="2537612" cy="2465793"/>
+            <a:off x="5883102" y="3663060"/>
+            <a:ext cx="1830262" cy="1653658"/>
           </a:xfrm>
           <a:prstGeom prst="rect">
             <a:avLst/>
           </a:prstGeom>
         </p:spPr>
       </p:pic>
+      <p:sp>
+        <p:nvSpPr>
+          <p:cNvPr id="17" name="Rectangle 16"/>
+          <p:cNvSpPr/>
+          <p:nvPr/>
+        </p:nvSpPr>
+        <p:spPr>
+          <a:xfrm>
+            <a:off x="3925191" y="2587407"/>
+            <a:ext cx="2270926" cy="1138773"/>
+          </a:xfrm>
+          <a:prstGeom prst="rect">
+            <a:avLst/>
+          </a:prstGeom>
+        </p:spPr>
+        <p:txBody>
+          <a:bodyPr wrap="square">
+            <a:spAutoFit/>
+          </a:bodyPr>
+          <a:lstStyle/>
+          <a:p>
+            <a:pPr algn="ctr"/>
+            <a:r>
+              <a:rPr lang="en-US" sz="2400" b="1" dirty="0">
+                <a:solidFill>
+                  <a:schemeClr val="bg2"/>
+                </a:solidFill>
+              </a:rPr>
+              <a:t>William </a:t>
+            </a:r>
+            <a:r>
+              <a:rPr lang="en-US" sz="2400" b="1" dirty="0" err="1">
+                <a:solidFill>
+                  <a:schemeClr val="bg2"/>
+                </a:solidFill>
+              </a:rPr>
+              <a:t>Molyneux</a:t>
+            </a:r>
+            <a:r>
+              <a:rPr lang="en-US" sz="2400" b="1" dirty="0">
+                <a:solidFill>
+                  <a:schemeClr val="bg2"/>
+                </a:solidFill>
+              </a:rPr>
+              <a:t> </a:t>
+            </a:r>
+            <a:r>
+              <a:rPr lang="en-US" sz="2000" b="1" dirty="0">
+                <a:solidFill>
+                  <a:schemeClr val="bg2"/>
+                </a:solidFill>
+              </a:rPr>
+              <a:t>(1656–1698</a:t>
+            </a:r>
+            <a:r>
+              <a:rPr lang="en-US" sz="2000" b="1" dirty="0" smtClean="0">
+                <a:solidFill>
+                  <a:schemeClr val="bg2"/>
+                </a:solidFill>
+              </a:rPr>
+              <a:t>)</a:t>
+            </a:r>
+            <a:endParaRPr lang="en-US" sz="2000" dirty="0">
+              <a:solidFill>
+                <a:schemeClr val="bg2"/>
+              </a:solidFill>
+            </a:endParaRPr>
+          </a:p>
+        </p:txBody>
+      </p:sp>
       <p:pic>
         <p:nvPicPr>
-          <p:cNvPr id="5124" name="Picture 4" descr="John Locke - Wikipedia"/>
+          <p:cNvPr id="15" name="Picture 6" descr="Cubes - Intermediate Geometry"/>
           <p:cNvPicPr>
             <a:picLocks noChangeAspect="1" noChangeArrowheads="1"/>
           </p:cNvPicPr>
           <p:nvPr/>
         </p:nvPicPr>
         <p:blipFill>
-          <a:blip r:embed="rId8">
+          <a:blip r:embed="rId8" cstate="print">
             <a:extLst>
               <a:ext uri="{28A0092B-C50C-407E-A947-70E740481C1C}">
                 <a14:useLocalDpi xmlns:a14="http://schemas.microsoft.com/office/drawing/2010/main" val="0"/>
@@ -12546,8 +11885,8 @@
         </p:blipFill>
         <p:spPr bwMode="auto">
           <a:xfrm>
-            <a:off x="9132686" y="2552700"/>
-            <a:ext cx="3059314" cy="4292600"/>
+            <a:off x="5883102" y="2155121"/>
+            <a:ext cx="1708758" cy="1650936"/>
           </a:xfrm>
           <a:prstGeom prst="rect">
             <a:avLst/>
@@ -12564,16 +11903,98 @@
           </a:extLst>
         </p:spPr>
       </p:pic>
-      <p:sp>
-        <p:nvSpPr>
-          <p:cNvPr id="8" name="Rectangle 7"/>
+      <p:pic>
+        <p:nvPicPr>
+          <p:cNvPr id="6" name="Picture 4" descr="undefined"/>
+          <p:cNvPicPr>
+            <a:picLocks noChangeAspect="1" noChangeArrowheads="1"/>
+          </p:cNvPicPr>
+          <p:nvPr/>
+        </p:nvPicPr>
+        <p:blipFill>
+          <a:blip r:embed="rId9" cstate="print">
+            <a:extLst>
+              <a:ext uri="{28A0092B-C50C-407E-A947-70E740481C1C}">
+                <a14:useLocalDpi xmlns:a14="http://schemas.microsoft.com/office/drawing/2010/main" val="0"/>
+              </a:ext>
+            </a:extLst>
+          </a:blip>
+          <a:srcRect/>
+          <a:stretch>
+            <a:fillRect/>
+          </a:stretch>
+        </p:blipFill>
+        <p:spPr bwMode="auto">
+          <a:xfrm>
+            <a:off x="2833997" y="5266182"/>
+            <a:ext cx="756763" cy="1012466"/>
+          </a:xfrm>
+          <a:prstGeom prst="rect">
+            <a:avLst/>
+          </a:prstGeom>
+          <a:noFill/>
+          <a:extLst>
+            <a:ext uri="{909E8E84-426E-40DD-AFC4-6F175D3DCCD1}">
+              <a14:hiddenFill xmlns:a14="http://schemas.microsoft.com/office/drawing/2010/main">
+                <a:solidFill>
+                  <a:srgbClr val="FFFFFF"/>
+                </a:solidFill>
+              </a14:hiddenFill>
+            </a:ext>
+          </a:extLst>
+        </p:spPr>
+      </p:pic>
+      <p:pic>
+        <p:nvPicPr>
+          <p:cNvPr id="5124" name="Picture 4" descr="John Locke - Wikipedia"/>
+          <p:cNvPicPr>
+            <a:picLocks noChangeAspect="1" noChangeArrowheads="1"/>
+          </p:cNvPicPr>
+          <p:nvPr/>
+        </p:nvPicPr>
+        <p:blipFill>
+          <a:blip r:embed="rId10" cstate="print">
+            <a:extLst>
+              <a:ext uri="{28A0092B-C50C-407E-A947-70E740481C1C}">
+                <a14:useLocalDpi xmlns:a14="http://schemas.microsoft.com/office/drawing/2010/main" val="0"/>
+              </a:ext>
+            </a:extLst>
+          </a:blip>
+          <a:srcRect/>
+          <a:stretch>
+            <a:fillRect/>
+          </a:stretch>
+        </p:blipFill>
+        <p:spPr bwMode="auto">
+          <a:xfrm>
+            <a:off x="7566163" y="3314700"/>
+            <a:ext cx="2610772" cy="3663239"/>
+          </a:xfrm>
+          <a:prstGeom prst="rect">
+            <a:avLst/>
+          </a:prstGeom>
+          <a:noFill/>
+          <a:extLst>
+            <a:ext uri="{909E8E84-426E-40DD-AFC4-6F175D3DCCD1}">
+              <a14:hiddenFill xmlns:a14="http://schemas.microsoft.com/office/drawing/2010/main">
+                <a:solidFill>
+                  <a:srgbClr val="FFFFFF"/>
+                </a:solidFill>
+              </a14:hiddenFill>
+            </a:ext>
+          </a:extLst>
+        </p:spPr>
+      </p:pic>
+      <p:sp>
+        <p:nvSpPr>
+          <p:cNvPr id="18" name="Rectangle 17"/>
           <p:cNvSpPr/>
           <p:nvPr/>
         </p:nvSpPr>
         <p:spPr>
           <a:xfrm>
-            <a:off x="3288052" y="5862382"/>
-            <a:ext cx="2846048" cy="954107"/>
+            <a:off x="10326193" y="2761466"/>
+            <a:ext cx="1865807" cy="1138773"/>
           </a:xfrm>
           <a:prstGeom prst="rect">
             <a:avLst/>
@@ -12585,63 +12006,110 @@
           </a:bodyPr>
           <a:lstStyle/>
           <a:p>
-            <a:r>
-              <a:rPr lang="en-US" sz="2800" dirty="0">
+            <a:pPr algn="r"/>
+            <a:r>
+              <a:rPr lang="en-US" sz="2400" dirty="0">
                 <a:solidFill>
                   <a:schemeClr val="bg2"/>
                 </a:solidFill>
               </a:rPr>
-              <a:t>René Descartes (1596–1650</a:t>
-            </a:r>
-            <a:r>
-              <a:rPr lang="en-US" sz="2800" dirty="0" smtClean="0">
+              <a:t>Immanuel </a:t>
+            </a:r>
+            <a:r>
+              <a:rPr lang="en-US" sz="2400" dirty="0" smtClean="0">
                 <a:solidFill>
                   <a:schemeClr val="bg2"/>
                 </a:solidFill>
               </a:rPr>
-              <a:t>)</a:t>
-            </a:r>
-            <a:endParaRPr lang="en-US" sz="2800" dirty="0">
-              <a:solidFill>
-                <a:schemeClr val="bg2"/>
-              </a:solidFill>
-            </a:endParaRPr>
-          </a:p>
-        </p:txBody>
-      </p:sp>
-      <p:sp>
-        <p:nvSpPr>
-          <p:cNvPr id="11" name="Rectangle 10"/>
-          <p:cNvSpPr/>
+              <a:t>Kant</a:t>
+            </a:r>
+          </a:p>
+          <a:p>
+            <a:pPr algn="r"/>
+            <a:r>
+              <a:rPr lang="en-US" sz="2000" dirty="0" smtClean="0">
+                <a:solidFill>
+                  <a:schemeClr val="bg2"/>
+                </a:solidFill>
+              </a:rPr>
+              <a:t>(</a:t>
+            </a:r>
+            <a:r>
+              <a:rPr lang="en-US" sz="2000" dirty="0">
+                <a:solidFill>
+                  <a:schemeClr val="bg2"/>
+                </a:solidFill>
+              </a:rPr>
+              <a:t>1724–1804)</a:t>
+            </a:r>
+          </a:p>
+        </p:txBody>
+      </p:sp>
+      <p:pic>
+        <p:nvPicPr>
+          <p:cNvPr id="19" name="Picture 2" descr="Immanuel Kant - Wikipedia"/>
+          <p:cNvPicPr>
+            <a:picLocks noChangeAspect="1" noChangeArrowheads="1"/>
+          </p:cNvPicPr>
           <p:nvPr/>
-        </p:nvSpPr>
+        </p:nvPicPr>
+        <p:blipFill>
+          <a:blip r:embed="rId11" cstate="print">
+            <a:extLst>
+              <a:ext uri="{28A0092B-C50C-407E-A947-70E740481C1C}">
+                <a14:useLocalDpi xmlns:a14="http://schemas.microsoft.com/office/drawing/2010/main" val="0"/>
+              </a:ext>
+            </a:extLst>
+          </a:blip>
+          <a:srcRect/>
+          <a:stretch>
+            <a:fillRect/>
+          </a:stretch>
+        </p:blipFill>
+        <p:spPr bwMode="auto">
+          <a:xfrm>
+            <a:off x="9877820" y="3881382"/>
+            <a:ext cx="2391142" cy="3120440"/>
+          </a:xfrm>
+          <a:prstGeom prst="rect">
+            <a:avLst/>
+          </a:prstGeom>
+          <a:noFill/>
+          <a:extLst>
+            <a:ext uri="{909E8E84-426E-40DD-AFC4-6F175D3DCCD1}">
+              <a14:hiddenFill xmlns:a14="http://schemas.microsoft.com/office/drawing/2010/main">
+                <a:solidFill>
+                  <a:srgbClr val="FFFFFF"/>
+                </a:solidFill>
+              </a14:hiddenFill>
+            </a:ext>
+          </a:extLst>
+        </p:spPr>
+      </p:pic>
+      <p:pic>
+        <p:nvPicPr>
+          <p:cNvPr id="20" name="Picture 19"/>
+          <p:cNvPicPr>
+            <a:picLocks noChangeAspect="1"/>
+          </p:cNvPicPr>
+          <p:nvPr/>
+        </p:nvPicPr>
+        <p:blipFill>
+          <a:blip r:embed="rId12"/>
+          <a:stretch>
+            <a:fillRect/>
+          </a:stretch>
+        </p:blipFill>
         <p:spPr>
           <a:xfrm>
-            <a:off x="9752716" y="1636958"/>
-            <a:ext cx="2409486" cy="954107"/>
+            <a:off x="6187307" y="-53409"/>
+            <a:ext cx="6004693" cy="1514004"/>
           </a:xfrm>
           <a:prstGeom prst="rect">
             <a:avLst/>
           </a:prstGeom>
         </p:spPr>
-        <p:txBody>
-          <a:bodyPr wrap="square">
-            <a:spAutoFit/>
-          </a:bodyPr>
-          <a:lstStyle/>
-          <a:p>
-            <a:pPr algn="r"/>
-            <a:r>
-              <a:rPr lang="en-US" sz="2800" dirty="0">
-                <a:solidFill>
-                  <a:schemeClr val="bg2"/>
-                </a:solidFill>
-              </a:rPr>
-              <a:t>John Locke (1632–1704)</a:t>
-            </a:r>
-          </a:p>
-        </p:txBody>
-      </p:sp>
+      </p:pic>
     </p:spTree>
     <p:extLst>
       <p:ext uri="{BB962C8B-B14F-4D97-AF65-F5344CB8AC3E}">
@@ -13057,7 +12525,7 @@
                                           </p:stCondLst>
                                         </p:cTn>
                                         <p:tgtEl>
-                                          <p:spTgt spid="5126"/>
+                                          <p:spTgt spid="14"/>
                                         </p:tgtEl>
                                         <p:attrNameLst>
                                           <p:attrName>style.visibility</p:attrName>
@@ -13071,7 +12539,7 @@
                                       <p:cBhvr>
                                         <p:cTn id="42" dur="500"/>
                                         <p:tgtEl>
-                                          <p:spTgt spid="5126"/>
+                                          <p:spTgt spid="14"/>
                                         </p:tgtEl>
                                       </p:cBhvr>
                                     </p:animEffect>
@@ -13097,7 +12565,7 @@
                             </p:stCondLst>
                             <p:childTnLst>
                               <p:par>
-                                <p:cTn id="45" presetID="10" presetClass="entr" presetSubtype="0" fill="hold" nodeType="clickEffect">
+                                <p:cTn id="45" presetID="10" presetClass="entr" presetSubtype="0" fill="hold" grpId="0" nodeType="clickEffect">
                                   <p:stCondLst>
                                     <p:cond delay="0"/>
                                   </p:stCondLst>
@@ -13110,7 +12578,7 @@
                                           </p:stCondLst>
                                         </p:cTn>
                                         <p:tgtEl>
-                                          <p:spTgt spid="5124"/>
+                                          <p:spTgt spid="17"/>
                                         </p:tgtEl>
                                         <p:attrNameLst>
                                           <p:attrName>style.visibility</p:attrName>
@@ -13124,7 +12592,7 @@
                                       <p:cBhvr>
                                         <p:cTn id="47" dur="500"/>
                                         <p:tgtEl>
-                                          <p:spTgt spid="5124"/>
+                                          <p:spTgt spid="17"/>
                                         </p:tgtEl>
                                       </p:cBhvr>
                                     </p:animEffect>
@@ -13150,7 +12618,7 @@
                             </p:stCondLst>
                             <p:childTnLst>
                               <p:par>
-                                <p:cTn id="50" presetID="10" presetClass="entr" presetSubtype="0" fill="hold" grpId="0" nodeType="clickEffect">
+                                <p:cTn id="50" presetID="10" presetClass="entr" presetSubtype="0" fill="hold" nodeType="clickEffect">
                                   <p:stCondLst>
                                     <p:cond delay="0"/>
                                   </p:stCondLst>
@@ -13163,7 +12631,7 @@
                                           </p:stCondLst>
                                         </p:cTn>
                                         <p:tgtEl>
-                                          <p:spTgt spid="11"/>
+                                          <p:spTgt spid="15"/>
                                         </p:tgtEl>
                                         <p:attrNameLst>
                                           <p:attrName>style.visibility</p:attrName>
@@ -13177,7 +12645,7 @@
                                       <p:cBhvr>
                                         <p:cTn id="52" dur="500"/>
                                         <p:tgtEl>
-                                          <p:spTgt spid="11"/>
+                                          <p:spTgt spid="15"/>
                                         </p:tgtEl>
                                       </p:cBhvr>
                                     </p:animEffect>
@@ -13216,7 +12684,7 @@
                                           </p:stCondLst>
                                         </p:cTn>
                                         <p:tgtEl>
-                                          <p:spTgt spid="5"/>
+                                          <p:spTgt spid="16"/>
                                         </p:tgtEl>
                                         <p:attrNameLst>
                                           <p:attrName>style.visibility</p:attrName>
@@ -13230,7 +12698,325 @@
                                       <p:cBhvr>
                                         <p:cTn id="57" dur="500"/>
                                         <p:tgtEl>
+                                          <p:spTgt spid="16"/>
+                                        </p:tgtEl>
+                                      </p:cBhvr>
+                                    </p:animEffect>
+                                  </p:childTnLst>
+                                </p:cTn>
+                              </p:par>
+                            </p:childTnLst>
+                          </p:cTn>
+                        </p:par>
+                      </p:childTnLst>
+                    </p:cTn>
+                  </p:par>
+                  <p:par>
+                    <p:cTn id="58" fill="hold">
+                      <p:stCondLst>
+                        <p:cond delay="indefinite"/>
+                      </p:stCondLst>
+                      <p:childTnLst>
+                        <p:par>
+                          <p:cTn id="59" fill="hold">
+                            <p:stCondLst>
+                              <p:cond delay="0"/>
+                            </p:stCondLst>
+                            <p:childTnLst>
+                              <p:par>
+                                <p:cTn id="60" presetID="10" presetClass="entr" presetSubtype="0" fill="hold" nodeType="clickEffect">
+                                  <p:stCondLst>
+                                    <p:cond delay="0"/>
+                                  </p:stCondLst>
+                                  <p:childTnLst>
+                                    <p:set>
+                                      <p:cBhvr>
+                                        <p:cTn id="61" dur="1" fill="hold">
+                                          <p:stCondLst>
+                                            <p:cond delay="0"/>
+                                          </p:stCondLst>
+                                        </p:cTn>
+                                        <p:tgtEl>
+                                          <p:spTgt spid="5124"/>
+                                        </p:tgtEl>
+                                        <p:attrNameLst>
+                                          <p:attrName>style.visibility</p:attrName>
+                                        </p:attrNameLst>
+                                      </p:cBhvr>
+                                      <p:to>
+                                        <p:strVal val="visible"/>
+                                      </p:to>
+                                    </p:set>
+                                    <p:animEffect transition="in" filter="fade">
+                                      <p:cBhvr>
+                                        <p:cTn id="62" dur="500"/>
+                                        <p:tgtEl>
+                                          <p:spTgt spid="5124"/>
+                                        </p:tgtEl>
+                                      </p:cBhvr>
+                                    </p:animEffect>
+                                  </p:childTnLst>
+                                </p:cTn>
+                              </p:par>
+                            </p:childTnLst>
+                          </p:cTn>
+                        </p:par>
+                      </p:childTnLst>
+                    </p:cTn>
+                  </p:par>
+                  <p:par>
+                    <p:cTn id="63" fill="hold">
+                      <p:stCondLst>
+                        <p:cond delay="indefinite"/>
+                      </p:stCondLst>
+                      <p:childTnLst>
+                        <p:par>
+                          <p:cTn id="64" fill="hold">
+                            <p:stCondLst>
+                              <p:cond delay="0"/>
+                            </p:stCondLst>
+                            <p:childTnLst>
+                              <p:par>
+                                <p:cTn id="65" presetID="10" presetClass="entr" presetSubtype="0" fill="hold" grpId="0" nodeType="clickEffect">
+                                  <p:stCondLst>
+                                    <p:cond delay="0"/>
+                                  </p:stCondLst>
+                                  <p:childTnLst>
+                                    <p:set>
+                                      <p:cBhvr>
+                                        <p:cTn id="66" dur="1" fill="hold">
+                                          <p:stCondLst>
+                                            <p:cond delay="0"/>
+                                          </p:stCondLst>
+                                        </p:cTn>
+                                        <p:tgtEl>
+                                          <p:spTgt spid="11"/>
+                                        </p:tgtEl>
+                                        <p:attrNameLst>
+                                          <p:attrName>style.visibility</p:attrName>
+                                        </p:attrNameLst>
+                                      </p:cBhvr>
+                                      <p:to>
+                                        <p:strVal val="visible"/>
+                                      </p:to>
+                                    </p:set>
+                                    <p:animEffect transition="in" filter="fade">
+                                      <p:cBhvr>
+                                        <p:cTn id="67" dur="500"/>
+                                        <p:tgtEl>
+                                          <p:spTgt spid="11"/>
+                                        </p:tgtEl>
+                                      </p:cBhvr>
+                                    </p:animEffect>
+                                  </p:childTnLst>
+                                </p:cTn>
+                              </p:par>
+                            </p:childTnLst>
+                          </p:cTn>
+                        </p:par>
+                      </p:childTnLst>
+                    </p:cTn>
+                  </p:par>
+                  <p:par>
+                    <p:cTn id="68" fill="hold">
+                      <p:stCondLst>
+                        <p:cond delay="indefinite"/>
+                      </p:stCondLst>
+                      <p:childTnLst>
+                        <p:par>
+                          <p:cTn id="69" fill="hold">
+                            <p:stCondLst>
+                              <p:cond delay="0"/>
+                            </p:stCondLst>
+                            <p:childTnLst>
+                              <p:par>
+                                <p:cTn id="70" presetID="10" presetClass="entr" presetSubtype="0" fill="hold" nodeType="clickEffect">
+                                  <p:stCondLst>
+                                    <p:cond delay="0"/>
+                                  </p:stCondLst>
+                                  <p:childTnLst>
+                                    <p:set>
+                                      <p:cBhvr>
+                                        <p:cTn id="71" dur="1" fill="hold">
+                                          <p:stCondLst>
+                                            <p:cond delay="0"/>
+                                          </p:stCondLst>
+                                        </p:cTn>
+                                        <p:tgtEl>
                                           <p:spTgt spid="5"/>
+                                        </p:tgtEl>
+                                        <p:attrNameLst>
+                                          <p:attrName>style.visibility</p:attrName>
+                                        </p:attrNameLst>
+                                      </p:cBhvr>
+                                      <p:to>
+                                        <p:strVal val="visible"/>
+                                      </p:to>
+                                    </p:set>
+                                    <p:animEffect transition="in" filter="fade">
+                                      <p:cBhvr>
+                                        <p:cTn id="72" dur="500"/>
+                                        <p:tgtEl>
+                                          <p:spTgt spid="5"/>
+                                        </p:tgtEl>
+                                      </p:cBhvr>
+                                    </p:animEffect>
+                                  </p:childTnLst>
+                                </p:cTn>
+                              </p:par>
+                            </p:childTnLst>
+                          </p:cTn>
+                        </p:par>
+                      </p:childTnLst>
+                    </p:cTn>
+                  </p:par>
+                  <p:par>
+                    <p:cTn id="73" fill="hold">
+                      <p:stCondLst>
+                        <p:cond delay="indefinite"/>
+                      </p:stCondLst>
+                      <p:childTnLst>
+                        <p:par>
+                          <p:cTn id="74" fill="hold">
+                            <p:stCondLst>
+                              <p:cond delay="0"/>
+                            </p:stCondLst>
+                            <p:childTnLst>
+                              <p:par>
+                                <p:cTn id="75" presetID="10" presetClass="entr" presetSubtype="0" fill="hold" nodeType="clickEffect">
+                                  <p:stCondLst>
+                                    <p:cond delay="0"/>
+                                  </p:stCondLst>
+                                  <p:childTnLst>
+                                    <p:set>
+                                      <p:cBhvr>
+                                        <p:cTn id="76" dur="1" fill="hold">
+                                          <p:stCondLst>
+                                            <p:cond delay="0"/>
+                                          </p:stCondLst>
+                                        </p:cTn>
+                                        <p:tgtEl>
+                                          <p:spTgt spid="19"/>
+                                        </p:tgtEl>
+                                        <p:attrNameLst>
+                                          <p:attrName>style.visibility</p:attrName>
+                                        </p:attrNameLst>
+                                      </p:cBhvr>
+                                      <p:to>
+                                        <p:strVal val="visible"/>
+                                      </p:to>
+                                    </p:set>
+                                    <p:animEffect transition="in" filter="fade">
+                                      <p:cBhvr>
+                                        <p:cTn id="77" dur="500"/>
+                                        <p:tgtEl>
+                                          <p:spTgt spid="19"/>
+                                        </p:tgtEl>
+                                      </p:cBhvr>
+                                    </p:animEffect>
+                                  </p:childTnLst>
+                                </p:cTn>
+                              </p:par>
+                            </p:childTnLst>
+                          </p:cTn>
+                        </p:par>
+                      </p:childTnLst>
+                    </p:cTn>
+                  </p:par>
+                  <p:par>
+                    <p:cTn id="78" fill="hold">
+                      <p:stCondLst>
+                        <p:cond delay="indefinite"/>
+                      </p:stCondLst>
+                      <p:childTnLst>
+                        <p:par>
+                          <p:cTn id="79" fill="hold">
+                            <p:stCondLst>
+                              <p:cond delay="0"/>
+                            </p:stCondLst>
+                            <p:childTnLst>
+                              <p:par>
+                                <p:cTn id="80" presetID="10" presetClass="entr" presetSubtype="0" fill="hold" grpId="0" nodeType="clickEffect">
+                                  <p:stCondLst>
+                                    <p:cond delay="0"/>
+                                  </p:stCondLst>
+                                  <p:childTnLst>
+                                    <p:set>
+                                      <p:cBhvr>
+                                        <p:cTn id="81" dur="1" fill="hold">
+                                          <p:stCondLst>
+                                            <p:cond delay="0"/>
+                                          </p:stCondLst>
+                                        </p:cTn>
+                                        <p:tgtEl>
+                                          <p:spTgt spid="18"/>
+                                        </p:tgtEl>
+                                        <p:attrNameLst>
+                                          <p:attrName>style.visibility</p:attrName>
+                                        </p:attrNameLst>
+                                      </p:cBhvr>
+                                      <p:to>
+                                        <p:strVal val="visible"/>
+                                      </p:to>
+                                    </p:set>
+                                    <p:animEffect transition="in" filter="fade">
+                                      <p:cBhvr>
+                                        <p:cTn id="82" dur="500"/>
+                                        <p:tgtEl>
+                                          <p:spTgt spid="18"/>
+                                        </p:tgtEl>
+                                      </p:cBhvr>
+                                    </p:animEffect>
+                                  </p:childTnLst>
+                                </p:cTn>
+                              </p:par>
+                            </p:childTnLst>
+                          </p:cTn>
+                        </p:par>
+                      </p:childTnLst>
+                    </p:cTn>
+                  </p:par>
+                  <p:par>
+                    <p:cTn id="83" fill="hold">
+                      <p:stCondLst>
+                        <p:cond delay="indefinite"/>
+                      </p:stCondLst>
+                      <p:childTnLst>
+                        <p:par>
+                          <p:cTn id="84" fill="hold">
+                            <p:stCondLst>
+                              <p:cond delay="0"/>
+                            </p:stCondLst>
+                            <p:childTnLst>
+                              <p:par>
+                                <p:cTn id="85" presetID="10" presetClass="entr" presetSubtype="0" fill="hold" nodeType="clickEffect">
+                                  <p:stCondLst>
+                                    <p:cond delay="0"/>
+                                  </p:stCondLst>
+                                  <p:childTnLst>
+                                    <p:set>
+                                      <p:cBhvr>
+                                        <p:cTn id="86" dur="1" fill="hold">
+                                          <p:stCondLst>
+                                            <p:cond delay="0"/>
+                                          </p:stCondLst>
+                                        </p:cTn>
+                                        <p:tgtEl>
+                                          <p:spTgt spid="20"/>
+                                        </p:tgtEl>
+                                        <p:attrNameLst>
+                                          <p:attrName>style.visibility</p:attrName>
+                                        </p:attrNameLst>
+                                      </p:cBhvr>
+                                      <p:to>
+                                        <p:strVal val="visible"/>
+                                      </p:to>
+                                    </p:set>
+                                    <p:animEffect transition="in" filter="fade">
+                                      <p:cBhvr>
+                                        <p:cTn id="87" dur="500"/>
+                                        <p:tgtEl>
+                                          <p:spTgt spid="20"/>
                                         </p:tgtEl>
                                       </p:cBhvr>
                                     </p:animEffect>
@@ -13270,6 +13056,8 @@
       <p:bldP spid="10" grpId="0"/>
       <p:bldP spid="8" grpId="0"/>
       <p:bldP spid="11" grpId="0"/>
+      <p:bldP spid="17" grpId="0"/>
+      <p:bldP spid="18" grpId="0"/>
     </p:bldLst>
   </p:timing>
 </p:sld>
@@ -13433,7 +13221,7 @@
                   <a:schemeClr val="bg2"/>
                 </a:solidFill>
               </a:rPr>
-              <a:t>IS</a:t>
+              <a:t>IS …</a:t>
             </a:r>
             <a:endParaRPr lang="en-US" sz="5400" b="1" i="1" u="sng" dirty="0">
               <a:solidFill>

</xml_diff>